<commit_message>
New figs and defense ppt slides
</commit_message>
<xml_diff>
--- a/presentations/defense.pptx
+++ b/presentations/defense.pptx
@@ -5,7 +5,7 @@
     <p:sldMasterId id="2147483660" r:id="rId1"/>
   </p:sldMasterIdLst>
   <p:notesMasterIdLst>
-    <p:notesMasterId r:id="rId13"/>
+    <p:notesMasterId r:id="rId24"/>
   </p:notesMasterIdLst>
   <p:sldIdLst>
     <p:sldId id="256" r:id="rId2"/>
@@ -17,8 +17,19 @@
     <p:sldId id="268" r:id="rId8"/>
     <p:sldId id="265" r:id="rId9"/>
     <p:sldId id="257" r:id="rId10"/>
-    <p:sldId id="258" r:id="rId11"/>
-    <p:sldId id="259" r:id="rId12"/>
+    <p:sldId id="270" r:id="rId11"/>
+    <p:sldId id="272" r:id="rId12"/>
+    <p:sldId id="273" r:id="rId13"/>
+    <p:sldId id="274" r:id="rId14"/>
+    <p:sldId id="275" r:id="rId15"/>
+    <p:sldId id="276" r:id="rId16"/>
+    <p:sldId id="277" r:id="rId17"/>
+    <p:sldId id="278" r:id="rId18"/>
+    <p:sldId id="279" r:id="rId19"/>
+    <p:sldId id="259" r:id="rId20"/>
+    <p:sldId id="280" r:id="rId21"/>
+    <p:sldId id="271" r:id="rId22"/>
+    <p:sldId id="269" r:id="rId23"/>
   </p:sldIdLst>
   <p:sldSz cx="9144000" cy="6858000" type="screen4x3"/>
   <p:notesSz cx="6858000" cy="9144000"/>
@@ -631,6 +642,90 @@
     <p:extLst>
       <p:ext uri="{BB962C8B-B14F-4D97-AF65-F5344CB8AC3E}">
         <p14:creationId xmlns:p14="http://schemas.microsoft.com/office/powerpoint/2010/main" val="1031894804"/>
+      </p:ext>
+    </p:extLst>
+  </p:cSld>
+  <p:clrMapOvr>
+    <a:masterClrMapping/>
+  </p:clrMapOvr>
+</p:notes>
+</file>
+
+<file path=ppt/notesSlides/notesSlide2.xml><?xml version="1.0" encoding="utf-8"?>
+<p:notes xmlns:a="http://schemas.openxmlformats.org/drawingml/2006/main" xmlns:r="http://schemas.openxmlformats.org/officeDocument/2006/relationships" xmlns:p="http://schemas.openxmlformats.org/presentationml/2006/main">
+  <p:cSld>
+    <p:spTree>
+      <p:nvGrpSpPr>
+        <p:cNvPr id="1" name=""/>
+        <p:cNvGrpSpPr/>
+        <p:nvPr/>
+      </p:nvGrpSpPr>
+      <p:grpSpPr>
+        <a:xfrm>
+          <a:off x="0" y="0"/>
+          <a:ext cx="0" cy="0"/>
+          <a:chOff x="0" y="0"/>
+          <a:chExt cx="0" cy="0"/>
+        </a:xfrm>
+      </p:grpSpPr>
+      <p:sp>
+        <p:nvSpPr>
+          <p:cNvPr id="2" name="Slide Image Placeholder 1"/>
+          <p:cNvSpPr>
+            <a:spLocks noGrp="1" noRot="1" noChangeAspect="1"/>
+          </p:cNvSpPr>
+          <p:nvPr>
+            <p:ph type="sldImg"/>
+          </p:nvPr>
+        </p:nvSpPr>
+        <p:spPr/>
+      </p:sp>
+      <p:sp>
+        <p:nvSpPr>
+          <p:cNvPr id="3" name="Notes Placeholder 2"/>
+          <p:cNvSpPr>
+            <a:spLocks noGrp="1"/>
+          </p:cNvSpPr>
+          <p:nvPr>
+            <p:ph type="body" idx="1"/>
+          </p:nvPr>
+        </p:nvSpPr>
+        <p:spPr/>
+        <p:txBody>
+          <a:bodyPr/>
+          <a:lstStyle/>
+          <a:p>
+            <a:endParaRPr lang="en-US" dirty="0"/>
+          </a:p>
+        </p:txBody>
+      </p:sp>
+      <p:sp>
+        <p:nvSpPr>
+          <p:cNvPr id="4" name="Slide Number Placeholder 3"/>
+          <p:cNvSpPr>
+            <a:spLocks noGrp="1"/>
+          </p:cNvSpPr>
+          <p:nvPr>
+            <p:ph type="sldNum" sz="quarter" idx="10"/>
+          </p:nvPr>
+        </p:nvSpPr>
+        <p:spPr/>
+        <p:txBody>
+          <a:bodyPr/>
+          <a:lstStyle/>
+          <a:p>
+            <a:fld id="{72D62022-544B-4C4F-96A3-6045A2BA2447}" type="slidenum">
+              <a:rPr lang="en-US" smtClean="0"/>
+              <a:t>14</a:t>
+            </a:fld>
+            <a:endParaRPr lang="en-US"/>
+          </a:p>
+        </p:txBody>
+      </p:sp>
+    </p:spTree>
+    <p:extLst>
+      <p:ext uri="{BB962C8B-B14F-4D97-AF65-F5344CB8AC3E}">
+        <p14:creationId xmlns:p14="http://schemas.microsoft.com/office/powerpoint/2010/main" val="1992609141"/>
       </p:ext>
     </p:extLst>
   </p:cSld>
@@ -3584,40 +3679,326 @@
           <a:chExt cx="0" cy="0"/>
         </a:xfrm>
       </p:grpSpPr>
-      <p:pic>
-        <p:nvPicPr>
-          <p:cNvPr id="5" name="Picture 4"/>
-          <p:cNvPicPr>
-            <a:picLocks noChangeAspect="1"/>
-          </p:cNvPicPr>
+      <p:sp>
+        <p:nvSpPr>
+          <p:cNvPr id="2" name="Title 1"/>
+          <p:cNvSpPr>
+            <a:spLocks noGrp="1"/>
+          </p:cNvSpPr>
+          <p:nvPr>
+            <p:ph type="title"/>
+          </p:nvPr>
+        </p:nvSpPr>
+        <p:spPr/>
+        <p:txBody>
+          <a:bodyPr/>
+          <a:lstStyle/>
+          <a:p>
+            <a:r>
+              <a:rPr lang="en-US" dirty="0" smtClean="0"/>
+              <a:t>Groucho is recruited to thousands of sites throughout the genome</a:t>
+            </a:r>
+            <a:endParaRPr lang="en-US" dirty="0"/>
+          </a:p>
+        </p:txBody>
+      </p:sp>
+      <p:grpSp>
+        <p:nvGrpSpPr>
+          <p:cNvPr id="17" name="Group 16"/>
+          <p:cNvGrpSpPr/>
           <p:nvPr/>
-        </p:nvPicPr>
-        <p:blipFill>
-          <a:blip r:embed="rId2">
-            <a:extLst>
-              <a:ext uri="{28A0092B-C50C-407E-A947-70E740481C1C}">
-                <a14:useLocalDpi xmlns:a14="http://schemas.microsoft.com/office/drawing/2010/main" val="0"/>
-              </a:ext>
-            </a:extLst>
-          </a:blip>
-          <a:stretch>
-            <a:fillRect/>
-          </a:stretch>
-        </p:blipFill>
-        <p:spPr>
+        </p:nvGrpSpPr>
+        <p:grpSpPr>
           <a:xfrm>
-            <a:off x="1252437" y="1513138"/>
-            <a:ext cx="6023683" cy="4654664"/>
-          </a:xfrm>
-          <a:prstGeom prst="rect">
-            <a:avLst/>
-          </a:prstGeom>
-        </p:spPr>
-      </p:pic>
+            <a:off x="1749744" y="1980358"/>
+            <a:ext cx="5644512" cy="4703736"/>
+            <a:chOff x="1766153" y="2022888"/>
+            <a:chExt cx="5644512" cy="4703736"/>
+          </a:xfrm>
+        </p:grpSpPr>
+        <p:pic>
+          <p:nvPicPr>
+            <p:cNvPr id="10" name="Picture 9"/>
+            <p:cNvPicPr>
+              <a:picLocks noChangeAspect="1"/>
+            </p:cNvPicPr>
+            <p:nvPr/>
+          </p:nvPicPr>
+          <p:blipFill>
+            <a:blip r:embed="rId2">
+              <a:extLst>
+                <a:ext uri="{28A0092B-C50C-407E-A947-70E740481C1C}">
+                  <a14:useLocalDpi xmlns:a14="http://schemas.microsoft.com/office/drawing/2010/main" val="0"/>
+                </a:ext>
+              </a:extLst>
+            </a:blip>
+            <a:stretch>
+              <a:fillRect/>
+            </a:stretch>
+          </p:blipFill>
+          <p:spPr>
+            <a:xfrm>
+              <a:off x="2184078" y="2022888"/>
+              <a:ext cx="4703736" cy="4703736"/>
+            </a:xfrm>
+            <a:prstGeom prst="rect">
+              <a:avLst/>
+            </a:prstGeom>
+          </p:spPr>
+        </p:pic>
+        <p:sp>
+          <p:nvSpPr>
+            <p:cNvPr id="11" name="Rectangle 10"/>
+            <p:cNvSpPr/>
+            <p:nvPr/>
+          </p:nvSpPr>
+          <p:spPr>
+            <a:xfrm>
+              <a:off x="6013071" y="2387099"/>
+              <a:ext cx="656140" cy="356461"/>
+            </a:xfrm>
+            <a:prstGeom prst="rect">
+              <a:avLst/>
+            </a:prstGeom>
+            <a:solidFill>
+              <a:schemeClr val="bg1"/>
+            </a:solidFill>
+            <a:ln>
+              <a:solidFill>
+                <a:schemeClr val="bg1"/>
+              </a:solidFill>
+            </a:ln>
+          </p:spPr>
+          <p:style>
+            <a:lnRef idx="2">
+              <a:schemeClr val="accent1">
+                <a:shade val="50000"/>
+              </a:schemeClr>
+            </a:lnRef>
+            <a:fillRef idx="1">
+              <a:schemeClr val="accent1"/>
+            </a:fillRef>
+            <a:effectRef idx="0">
+              <a:schemeClr val="accent1"/>
+            </a:effectRef>
+            <a:fontRef idx="minor">
+              <a:schemeClr val="lt1"/>
+            </a:fontRef>
+          </p:style>
+          <p:txBody>
+            <a:bodyPr rtlCol="0" anchor="ctr"/>
+            <a:lstStyle/>
+            <a:p>
+              <a:pPr algn="ctr"/>
+              <a:endParaRPr lang="en-US"/>
+            </a:p>
+          </p:txBody>
+        </p:sp>
+        <p:sp>
+          <p:nvSpPr>
+            <p:cNvPr id="12" name="TextBox 11"/>
+            <p:cNvSpPr txBox="1"/>
+            <p:nvPr/>
+          </p:nvSpPr>
+          <p:spPr>
+            <a:xfrm>
+              <a:off x="6341141" y="3051337"/>
+              <a:ext cx="1069524" cy="369332"/>
+            </a:xfrm>
+            <a:prstGeom prst="rect">
+              <a:avLst/>
+            </a:prstGeom>
+            <a:solidFill>
+              <a:schemeClr val="bg1"/>
+            </a:solidFill>
+          </p:spPr>
+          <p:txBody>
+            <a:bodyPr wrap="none" rtlCol="0">
+              <a:spAutoFit/>
+            </a:bodyPr>
+            <a:lstStyle/>
+            <a:p>
+              <a:r>
+                <a:rPr lang="en-US" dirty="0" smtClean="0"/>
+                <a:t>1.5 – 4 </a:t>
+              </a:r>
+              <a:r>
+                <a:rPr lang="en-US" dirty="0" err="1" smtClean="0"/>
+                <a:t>hr</a:t>
+              </a:r>
+              <a:endParaRPr lang="en-US" dirty="0"/>
+            </a:p>
+          </p:txBody>
+        </p:sp>
+        <p:sp>
+          <p:nvSpPr>
+            <p:cNvPr id="13" name="TextBox 12"/>
+            <p:cNvSpPr txBox="1"/>
+            <p:nvPr/>
+          </p:nvSpPr>
+          <p:spPr>
+            <a:xfrm>
+              <a:off x="4001184" y="2202433"/>
+              <a:ext cx="1069524" cy="369332"/>
+            </a:xfrm>
+            <a:prstGeom prst="rect">
+              <a:avLst/>
+            </a:prstGeom>
+            <a:solidFill>
+              <a:schemeClr val="bg1"/>
+            </a:solidFill>
+          </p:spPr>
+          <p:txBody>
+            <a:bodyPr wrap="none" rtlCol="0">
+              <a:spAutoFit/>
+            </a:bodyPr>
+            <a:lstStyle/>
+            <a:p>
+              <a:r>
+                <a:rPr lang="en-US" dirty="0" smtClean="0"/>
+                <a:t>4 – 6.5 </a:t>
+              </a:r>
+              <a:r>
+                <a:rPr lang="en-US" dirty="0" err="1" smtClean="0"/>
+                <a:t>hr</a:t>
+              </a:r>
+              <a:endParaRPr lang="en-US" dirty="0"/>
+            </a:p>
+          </p:txBody>
+        </p:sp>
+        <p:sp>
+          <p:nvSpPr>
+            <p:cNvPr id="14" name="TextBox 13"/>
+            <p:cNvSpPr txBox="1"/>
+            <p:nvPr/>
+          </p:nvSpPr>
+          <p:spPr>
+            <a:xfrm>
+              <a:off x="1766153" y="2955787"/>
+              <a:ext cx="1069524" cy="369332"/>
+            </a:xfrm>
+            <a:prstGeom prst="rect">
+              <a:avLst/>
+            </a:prstGeom>
+            <a:solidFill>
+              <a:schemeClr val="bg1"/>
+            </a:solidFill>
+          </p:spPr>
+          <p:txBody>
+            <a:bodyPr wrap="none" rtlCol="0">
+              <a:spAutoFit/>
+            </a:bodyPr>
+            <a:lstStyle/>
+            <a:p>
+              <a:r>
+                <a:rPr lang="en-US" dirty="0" smtClean="0"/>
+                <a:t>6.5 – 9 </a:t>
+              </a:r>
+              <a:r>
+                <a:rPr lang="en-US" dirty="0" err="1" smtClean="0"/>
+                <a:t>hr</a:t>
+              </a:r>
+              <a:endParaRPr lang="en-US" dirty="0"/>
+            </a:p>
+          </p:txBody>
+        </p:sp>
+        <p:sp>
+          <p:nvSpPr>
+            <p:cNvPr id="15" name="Rectangle 14"/>
+            <p:cNvSpPr/>
+            <p:nvPr/>
+          </p:nvSpPr>
+          <p:spPr>
+            <a:xfrm>
+              <a:off x="6111297" y="6176297"/>
+              <a:ext cx="633663" cy="192506"/>
+            </a:xfrm>
+            <a:prstGeom prst="rect">
+              <a:avLst/>
+            </a:prstGeom>
+            <a:solidFill>
+              <a:schemeClr val="bg1"/>
+            </a:solidFill>
+            <a:ln>
+              <a:noFill/>
+            </a:ln>
+          </p:spPr>
+          <p:style>
+            <a:lnRef idx="2">
+              <a:schemeClr val="accent1">
+                <a:shade val="50000"/>
+              </a:schemeClr>
+            </a:lnRef>
+            <a:fillRef idx="1">
+              <a:schemeClr val="accent1"/>
+            </a:fillRef>
+            <a:effectRef idx="0">
+              <a:schemeClr val="accent1"/>
+            </a:effectRef>
+            <a:fontRef idx="minor">
+              <a:schemeClr val="lt1"/>
+            </a:fontRef>
+          </p:style>
+          <p:txBody>
+            <a:bodyPr rtlCol="0" anchor="ctr"/>
+            <a:lstStyle/>
+            <a:p>
+              <a:pPr algn="ctr"/>
+              <a:endParaRPr lang="en-US"/>
+            </a:p>
+          </p:txBody>
+        </p:sp>
+        <p:sp>
+          <p:nvSpPr>
+            <p:cNvPr id="16" name="Rectangle 15"/>
+            <p:cNvSpPr/>
+            <p:nvPr/>
+          </p:nvSpPr>
+          <p:spPr>
+            <a:xfrm flipV="1">
+              <a:off x="4219114" y="5844306"/>
+              <a:ext cx="633663" cy="331991"/>
+            </a:xfrm>
+            <a:prstGeom prst="rect">
+              <a:avLst/>
+            </a:prstGeom>
+            <a:solidFill>
+              <a:schemeClr val="bg1"/>
+            </a:solidFill>
+            <a:ln>
+              <a:noFill/>
+            </a:ln>
+          </p:spPr>
+          <p:style>
+            <a:lnRef idx="2">
+              <a:schemeClr val="accent1">
+                <a:shade val="50000"/>
+              </a:schemeClr>
+            </a:lnRef>
+            <a:fillRef idx="1">
+              <a:schemeClr val="accent1"/>
+            </a:fillRef>
+            <a:effectRef idx="0">
+              <a:schemeClr val="accent1"/>
+            </a:effectRef>
+            <a:fontRef idx="minor">
+              <a:schemeClr val="lt1"/>
+            </a:fontRef>
+          </p:style>
+          <p:txBody>
+            <a:bodyPr rtlCol="0" anchor="ctr"/>
+            <a:lstStyle/>
+            <a:p>
+              <a:pPr algn="ctr"/>
+              <a:endParaRPr lang="en-US"/>
+            </a:p>
+          </p:txBody>
+        </p:sp>
+      </p:grpSp>
     </p:spTree>
     <p:extLst>
       <p:ext uri="{BB962C8B-B14F-4D97-AF65-F5344CB8AC3E}">
-        <p14:creationId xmlns:p14="http://schemas.microsoft.com/office/powerpoint/2010/main" val="303582536"/>
+        <p14:creationId xmlns:p14="http://schemas.microsoft.com/office/powerpoint/2010/main" val="1522849447"/>
       </p:ext>
     </p:extLst>
   </p:cSld>
@@ -3666,6 +4047,2358 @@
           <a:bodyPr/>
           <a:lstStyle/>
           <a:p>
+            <a:endParaRPr lang="en-US"/>
+          </a:p>
+        </p:txBody>
+      </p:sp>
+      <p:grpSp>
+        <p:nvGrpSpPr>
+          <p:cNvPr id="22" name="Group 21"/>
+          <p:cNvGrpSpPr/>
+          <p:nvPr/>
+        </p:nvGrpSpPr>
+        <p:grpSpPr>
+          <a:xfrm>
+            <a:off x="628650" y="1417779"/>
+            <a:ext cx="5020013" cy="3556285"/>
+            <a:chOff x="313749" y="1363959"/>
+            <a:chExt cx="5020013" cy="3556285"/>
+          </a:xfrm>
+        </p:grpSpPr>
+        <p:pic>
+          <p:nvPicPr>
+            <p:cNvPr id="4" name="Picture 3"/>
+            <p:cNvPicPr>
+              <a:picLocks noChangeAspect="1"/>
+            </p:cNvPicPr>
+            <p:nvPr/>
+          </p:nvPicPr>
+          <p:blipFill>
+            <a:blip r:embed="rId2">
+              <a:extLst>
+                <a:ext uri="{28A0092B-C50C-407E-A947-70E740481C1C}">
+                  <a14:useLocalDpi xmlns:a14="http://schemas.microsoft.com/office/drawing/2010/main" val="0"/>
+                </a:ext>
+              </a:extLst>
+            </a:blip>
+            <a:stretch>
+              <a:fillRect/>
+            </a:stretch>
+          </p:blipFill>
+          <p:spPr>
+            <a:xfrm>
+              <a:off x="1119006" y="1363959"/>
+              <a:ext cx="3556285" cy="3556285"/>
+            </a:xfrm>
+            <a:prstGeom prst="rect">
+              <a:avLst/>
+            </a:prstGeom>
+          </p:spPr>
+        </p:pic>
+        <p:sp>
+          <p:nvSpPr>
+            <p:cNvPr id="6" name="Rectangle 5"/>
+            <p:cNvSpPr/>
+            <p:nvPr/>
+          </p:nvSpPr>
+          <p:spPr>
+            <a:xfrm>
+              <a:off x="4131147" y="2123257"/>
+              <a:ext cx="1075764" cy="504727"/>
+            </a:xfrm>
+            <a:prstGeom prst="rect">
+              <a:avLst/>
+            </a:prstGeom>
+            <a:solidFill>
+              <a:schemeClr val="bg1"/>
+            </a:solidFill>
+            <a:ln>
+              <a:noFill/>
+            </a:ln>
+          </p:spPr>
+          <p:style>
+            <a:lnRef idx="2">
+              <a:schemeClr val="accent1">
+                <a:shade val="50000"/>
+              </a:schemeClr>
+            </a:lnRef>
+            <a:fillRef idx="1">
+              <a:schemeClr val="accent1"/>
+            </a:fillRef>
+            <a:effectRef idx="0">
+              <a:schemeClr val="accent1"/>
+            </a:effectRef>
+            <a:fontRef idx="minor">
+              <a:schemeClr val="lt1"/>
+            </a:fontRef>
+          </p:style>
+          <p:txBody>
+            <a:bodyPr rtlCol="0" anchor="ctr"/>
+            <a:lstStyle/>
+            <a:p>
+              <a:pPr algn="ctr"/>
+              <a:endParaRPr lang="en-US"/>
+            </a:p>
+          </p:txBody>
+        </p:sp>
+        <p:sp>
+          <p:nvSpPr>
+            <p:cNvPr id="7" name="Rectangle 6"/>
+            <p:cNvSpPr/>
+            <p:nvPr/>
+          </p:nvSpPr>
+          <p:spPr>
+            <a:xfrm>
+              <a:off x="581124" y="1518951"/>
+              <a:ext cx="1075764" cy="504727"/>
+            </a:xfrm>
+            <a:prstGeom prst="rect">
+              <a:avLst/>
+            </a:prstGeom>
+            <a:solidFill>
+              <a:schemeClr val="bg1"/>
+            </a:solidFill>
+            <a:ln>
+              <a:noFill/>
+            </a:ln>
+          </p:spPr>
+          <p:style>
+            <a:lnRef idx="2">
+              <a:schemeClr val="accent1">
+                <a:shade val="50000"/>
+              </a:schemeClr>
+            </a:lnRef>
+            <a:fillRef idx="1">
+              <a:schemeClr val="accent1"/>
+            </a:fillRef>
+            <a:effectRef idx="0">
+              <a:schemeClr val="accent1"/>
+            </a:effectRef>
+            <a:fontRef idx="minor">
+              <a:schemeClr val="lt1"/>
+            </a:fontRef>
+          </p:style>
+          <p:txBody>
+            <a:bodyPr rtlCol="0" anchor="ctr"/>
+            <a:lstStyle/>
+            <a:p>
+              <a:pPr algn="ctr"/>
+              <a:endParaRPr lang="en-US"/>
+            </a:p>
+          </p:txBody>
+        </p:sp>
+        <p:sp>
+          <p:nvSpPr>
+            <p:cNvPr id="8" name="Rectangle 7"/>
+            <p:cNvSpPr/>
+            <p:nvPr/>
+          </p:nvSpPr>
+          <p:spPr>
+            <a:xfrm>
+              <a:off x="3865337" y="4227260"/>
+              <a:ext cx="1075764" cy="504727"/>
+            </a:xfrm>
+            <a:prstGeom prst="rect">
+              <a:avLst/>
+            </a:prstGeom>
+            <a:solidFill>
+              <a:schemeClr val="bg1"/>
+            </a:solidFill>
+            <a:ln>
+              <a:noFill/>
+            </a:ln>
+          </p:spPr>
+          <p:style>
+            <a:lnRef idx="2">
+              <a:schemeClr val="accent1">
+                <a:shade val="50000"/>
+              </a:schemeClr>
+            </a:lnRef>
+            <a:fillRef idx="1">
+              <a:schemeClr val="accent1"/>
+            </a:fillRef>
+            <a:effectRef idx="0">
+              <a:schemeClr val="accent1"/>
+            </a:effectRef>
+            <a:fontRef idx="minor">
+              <a:schemeClr val="lt1"/>
+            </a:fontRef>
+          </p:style>
+          <p:txBody>
+            <a:bodyPr rtlCol="0" anchor="ctr"/>
+            <a:lstStyle/>
+            <a:p>
+              <a:pPr algn="ctr"/>
+              <a:endParaRPr lang="en-US"/>
+            </a:p>
+          </p:txBody>
+        </p:sp>
+        <p:sp>
+          <p:nvSpPr>
+            <p:cNvPr id="12" name="TextBox 11"/>
+            <p:cNvSpPr txBox="1"/>
+            <p:nvPr/>
+          </p:nvSpPr>
+          <p:spPr>
+            <a:xfrm>
+              <a:off x="313749" y="2815372"/>
+              <a:ext cx="990464" cy="646331"/>
+            </a:xfrm>
+            <a:prstGeom prst="rect">
+              <a:avLst/>
+            </a:prstGeom>
+            <a:noFill/>
+          </p:spPr>
+          <p:txBody>
+            <a:bodyPr wrap="none" rtlCol="0">
+              <a:spAutoFit/>
+            </a:bodyPr>
+            <a:lstStyle/>
+            <a:p>
+              <a:r>
+                <a:rPr lang="en-US" sz="1200" dirty="0" smtClean="0"/>
+                <a:t>Embryo</a:t>
+              </a:r>
+            </a:p>
+            <a:p>
+              <a:r>
+                <a:rPr lang="en-US" sz="1200" dirty="0" err="1" smtClean="0"/>
+                <a:t>Gro</a:t>
+              </a:r>
+              <a:r>
+                <a:rPr lang="en-US" sz="1200" dirty="0" smtClean="0"/>
+                <a:t> ChIP-seq</a:t>
+              </a:r>
+            </a:p>
+            <a:p>
+              <a:r>
+                <a:rPr lang="en-US" sz="1200" dirty="0" smtClean="0"/>
+                <a:t>All Peaks</a:t>
+              </a:r>
+              <a:endParaRPr lang="en-US" sz="1200" dirty="0"/>
+            </a:p>
+          </p:txBody>
+        </p:sp>
+        <p:sp>
+          <p:nvSpPr>
+            <p:cNvPr id="13" name="TextBox 12"/>
+            <p:cNvSpPr txBox="1"/>
+            <p:nvPr/>
+          </p:nvSpPr>
+          <p:spPr>
+            <a:xfrm>
+              <a:off x="4300017" y="2815372"/>
+              <a:ext cx="1033745" cy="646331"/>
+            </a:xfrm>
+            <a:prstGeom prst="rect">
+              <a:avLst/>
+            </a:prstGeom>
+            <a:noFill/>
+          </p:spPr>
+          <p:txBody>
+            <a:bodyPr wrap="none" rtlCol="0">
+              <a:spAutoFit/>
+            </a:bodyPr>
+            <a:lstStyle/>
+            <a:p>
+              <a:r>
+                <a:rPr lang="en-US" sz="1200" dirty="0" err="1" smtClean="0"/>
+                <a:t>modENCODE</a:t>
+              </a:r>
+              <a:endParaRPr lang="en-US" sz="1200" dirty="0" smtClean="0"/>
+            </a:p>
+            <a:p>
+              <a:r>
+                <a:rPr lang="en-US" sz="1200" dirty="0" smtClean="0"/>
+                <a:t>Embryo</a:t>
+              </a:r>
+            </a:p>
+            <a:p>
+              <a:r>
+                <a:rPr lang="en-US" sz="1200" dirty="0" err="1" smtClean="0"/>
+                <a:t>Gro</a:t>
+              </a:r>
+              <a:r>
+                <a:rPr lang="en-US" sz="1200" dirty="0" smtClean="0"/>
+                <a:t> </a:t>
+              </a:r>
+              <a:r>
+                <a:rPr lang="en-US" sz="1200" dirty="0" err="1" smtClean="0"/>
+                <a:t>ChIP</a:t>
+              </a:r>
+              <a:r>
+                <a:rPr lang="en-US" sz="1200" dirty="0" smtClean="0"/>
+                <a:t>-chip</a:t>
+              </a:r>
+              <a:endParaRPr lang="en-US" sz="1200" dirty="0"/>
+            </a:p>
+          </p:txBody>
+        </p:sp>
+      </p:grpSp>
+      <p:grpSp>
+        <p:nvGrpSpPr>
+          <p:cNvPr id="21" name="Group 20"/>
+          <p:cNvGrpSpPr/>
+          <p:nvPr/>
+        </p:nvGrpSpPr>
+        <p:grpSpPr>
+          <a:xfrm>
+            <a:off x="3643544" y="3729428"/>
+            <a:ext cx="5258506" cy="3550023"/>
+            <a:chOff x="3879686" y="2043953"/>
+            <a:chExt cx="5258506" cy="3550023"/>
+          </a:xfrm>
+        </p:grpSpPr>
+        <p:pic>
+          <p:nvPicPr>
+            <p:cNvPr id="5" name="Picture 4"/>
+            <p:cNvPicPr>
+              <a:picLocks noChangeAspect="1"/>
+            </p:cNvPicPr>
+            <p:nvPr/>
+          </p:nvPicPr>
+          <p:blipFill>
+            <a:blip r:embed="rId3">
+              <a:extLst>
+                <a:ext uri="{28A0092B-C50C-407E-A947-70E740481C1C}">
+                  <a14:useLocalDpi xmlns:a14="http://schemas.microsoft.com/office/drawing/2010/main" val="0"/>
+                </a:ext>
+              </a:extLst>
+            </a:blip>
+            <a:stretch>
+              <a:fillRect/>
+            </a:stretch>
+          </p:blipFill>
+          <p:spPr>
+            <a:xfrm flipH="1">
+              <a:off x="4558553" y="2043953"/>
+              <a:ext cx="3550023" cy="3550023"/>
+            </a:xfrm>
+            <a:prstGeom prst="rect">
+              <a:avLst/>
+            </a:prstGeom>
+          </p:spPr>
+        </p:pic>
+        <p:sp>
+          <p:nvSpPr>
+            <p:cNvPr id="9" name="Rectangle 8"/>
+            <p:cNvSpPr/>
+            <p:nvPr/>
+          </p:nvSpPr>
+          <p:spPr>
+            <a:xfrm>
+              <a:off x="7637929" y="4552293"/>
+              <a:ext cx="1075764" cy="504727"/>
+            </a:xfrm>
+            <a:prstGeom prst="rect">
+              <a:avLst/>
+            </a:prstGeom>
+            <a:solidFill>
+              <a:schemeClr val="bg1"/>
+            </a:solidFill>
+            <a:ln>
+              <a:noFill/>
+            </a:ln>
+          </p:spPr>
+          <p:style>
+            <a:lnRef idx="2">
+              <a:schemeClr val="accent1">
+                <a:shade val="50000"/>
+              </a:schemeClr>
+            </a:lnRef>
+            <a:fillRef idx="1">
+              <a:schemeClr val="accent1"/>
+            </a:fillRef>
+            <a:effectRef idx="0">
+              <a:schemeClr val="accent1"/>
+            </a:effectRef>
+            <a:fontRef idx="minor">
+              <a:schemeClr val="lt1"/>
+            </a:fontRef>
+          </p:style>
+          <p:txBody>
+            <a:bodyPr rtlCol="0" anchor="ctr"/>
+            <a:lstStyle/>
+            <a:p>
+              <a:pPr algn="ctr"/>
+              <a:endParaRPr lang="en-US"/>
+            </a:p>
+          </p:txBody>
+        </p:sp>
+        <p:sp>
+          <p:nvSpPr>
+            <p:cNvPr id="10" name="Rectangle 9"/>
+            <p:cNvSpPr/>
+            <p:nvPr/>
+          </p:nvSpPr>
+          <p:spPr>
+            <a:xfrm>
+              <a:off x="7301753" y="4992914"/>
+              <a:ext cx="1075764" cy="504727"/>
+            </a:xfrm>
+            <a:prstGeom prst="rect">
+              <a:avLst/>
+            </a:prstGeom>
+            <a:solidFill>
+              <a:schemeClr val="bg1"/>
+            </a:solidFill>
+            <a:ln>
+              <a:noFill/>
+            </a:ln>
+          </p:spPr>
+          <p:style>
+            <a:lnRef idx="2">
+              <a:schemeClr val="accent1">
+                <a:shade val="50000"/>
+              </a:schemeClr>
+            </a:lnRef>
+            <a:fillRef idx="1">
+              <a:schemeClr val="accent1"/>
+            </a:fillRef>
+            <a:effectRef idx="0">
+              <a:schemeClr val="accent1"/>
+            </a:effectRef>
+            <a:fontRef idx="minor">
+              <a:schemeClr val="lt1"/>
+            </a:fontRef>
+          </p:style>
+          <p:txBody>
+            <a:bodyPr rtlCol="0" anchor="ctr"/>
+            <a:lstStyle/>
+            <a:p>
+              <a:pPr algn="ctr"/>
+              <a:endParaRPr lang="en-US"/>
+            </a:p>
+          </p:txBody>
+        </p:sp>
+        <p:sp>
+          <p:nvSpPr>
+            <p:cNvPr id="11" name="Rectangle 10"/>
+            <p:cNvSpPr/>
+            <p:nvPr/>
+          </p:nvSpPr>
+          <p:spPr>
+            <a:xfrm>
+              <a:off x="4148419" y="4552293"/>
+              <a:ext cx="1075764" cy="809443"/>
+            </a:xfrm>
+            <a:prstGeom prst="rect">
+              <a:avLst/>
+            </a:prstGeom>
+            <a:solidFill>
+              <a:schemeClr val="bg1"/>
+            </a:solidFill>
+            <a:ln>
+              <a:noFill/>
+            </a:ln>
+          </p:spPr>
+          <p:style>
+            <a:lnRef idx="2">
+              <a:schemeClr val="accent1">
+                <a:shade val="50000"/>
+              </a:schemeClr>
+            </a:lnRef>
+            <a:fillRef idx="1">
+              <a:schemeClr val="accent1"/>
+            </a:fillRef>
+            <a:effectRef idx="0">
+              <a:schemeClr val="accent1"/>
+            </a:effectRef>
+            <a:fontRef idx="minor">
+              <a:schemeClr val="lt1"/>
+            </a:fontRef>
+          </p:style>
+          <p:txBody>
+            <a:bodyPr rtlCol="0" anchor="ctr"/>
+            <a:lstStyle/>
+            <a:p>
+              <a:pPr algn="ctr"/>
+              <a:endParaRPr lang="en-US"/>
+            </a:p>
+          </p:txBody>
+        </p:sp>
+        <p:sp>
+          <p:nvSpPr>
+            <p:cNvPr id="14" name="TextBox 13"/>
+            <p:cNvSpPr txBox="1"/>
+            <p:nvPr/>
+          </p:nvSpPr>
+          <p:spPr>
+            <a:xfrm>
+              <a:off x="3879686" y="3495366"/>
+              <a:ext cx="738023" cy="646331"/>
+            </a:xfrm>
+            <a:prstGeom prst="rect">
+              <a:avLst/>
+            </a:prstGeom>
+            <a:noFill/>
+          </p:spPr>
+          <p:txBody>
+            <a:bodyPr wrap="none" rtlCol="0">
+              <a:spAutoFit/>
+            </a:bodyPr>
+            <a:lstStyle/>
+            <a:p>
+              <a:r>
+                <a:rPr lang="en-US" sz="1200" dirty="0" smtClean="0"/>
+                <a:t>Embryo</a:t>
+              </a:r>
+            </a:p>
+            <a:p>
+              <a:r>
+                <a:rPr lang="en-US" sz="1200" dirty="0" err="1" smtClean="0"/>
+                <a:t>Gro</a:t>
+              </a:r>
+              <a:r>
+                <a:rPr lang="en-US" sz="1200" dirty="0" smtClean="0"/>
+                <a:t> </a:t>
+              </a:r>
+              <a:r>
+                <a:rPr lang="en-US" sz="1200" dirty="0" err="1" smtClean="0"/>
+                <a:t>ChIP</a:t>
+              </a:r>
+              <a:endParaRPr lang="en-US" sz="1200" dirty="0" smtClean="0"/>
+            </a:p>
+            <a:p>
+              <a:r>
+                <a:rPr lang="en-US" sz="1200" dirty="0" smtClean="0"/>
+                <a:t>All Peaks</a:t>
+              </a:r>
+              <a:endParaRPr lang="en-US" sz="1200" dirty="0"/>
+            </a:p>
+          </p:txBody>
+        </p:sp>
+        <p:sp>
+          <p:nvSpPr>
+            <p:cNvPr id="15" name="Rectangle 14"/>
+            <p:cNvSpPr/>
+            <p:nvPr/>
+          </p:nvSpPr>
+          <p:spPr>
+            <a:xfrm>
+              <a:off x="4982955" y="3577458"/>
+              <a:ext cx="640581" cy="564239"/>
+            </a:xfrm>
+            <a:prstGeom prst="rect">
+              <a:avLst/>
+            </a:prstGeom>
+            <a:solidFill>
+              <a:srgbClr val="9398FF"/>
+            </a:solidFill>
+            <a:ln>
+              <a:noFill/>
+            </a:ln>
+          </p:spPr>
+          <p:style>
+            <a:lnRef idx="2">
+              <a:schemeClr val="accent1">
+                <a:shade val="50000"/>
+              </a:schemeClr>
+            </a:lnRef>
+            <a:fillRef idx="1">
+              <a:schemeClr val="accent1"/>
+            </a:fillRef>
+            <a:effectRef idx="0">
+              <a:schemeClr val="accent1"/>
+            </a:effectRef>
+            <a:fontRef idx="minor">
+              <a:schemeClr val="lt1"/>
+            </a:fontRef>
+          </p:style>
+          <p:txBody>
+            <a:bodyPr rtlCol="0" anchor="ctr"/>
+            <a:lstStyle/>
+            <a:p>
+              <a:pPr algn="ctr"/>
+              <a:r>
+                <a:rPr lang="en-US" sz="1200" dirty="0" smtClean="0">
+                  <a:solidFill>
+                    <a:sysClr val="windowText" lastClr="000000"/>
+                  </a:solidFill>
+                </a:rPr>
+                <a:t>3823</a:t>
+              </a:r>
+              <a:endParaRPr lang="en-US" sz="1200" dirty="0">
+                <a:solidFill>
+                  <a:sysClr val="windowText" lastClr="000000"/>
+                </a:solidFill>
+              </a:endParaRPr>
+            </a:p>
+          </p:txBody>
+        </p:sp>
+        <p:sp>
+          <p:nvSpPr>
+            <p:cNvPr id="16" name="Rectangle 15"/>
+            <p:cNvSpPr/>
+            <p:nvPr/>
+          </p:nvSpPr>
+          <p:spPr>
+            <a:xfrm>
+              <a:off x="5778649" y="3727094"/>
+              <a:ext cx="554916" cy="264965"/>
+            </a:xfrm>
+            <a:prstGeom prst="rect">
+              <a:avLst/>
+            </a:prstGeom>
+            <a:solidFill>
+              <a:srgbClr val="5894CC"/>
+            </a:solidFill>
+            <a:ln>
+              <a:noFill/>
+            </a:ln>
+          </p:spPr>
+          <p:style>
+            <a:lnRef idx="2">
+              <a:schemeClr val="accent1">
+                <a:shade val="50000"/>
+              </a:schemeClr>
+            </a:lnRef>
+            <a:fillRef idx="1">
+              <a:schemeClr val="accent1"/>
+            </a:fillRef>
+            <a:effectRef idx="0">
+              <a:schemeClr val="accent1"/>
+            </a:effectRef>
+            <a:fontRef idx="minor">
+              <a:schemeClr val="lt1"/>
+            </a:fontRef>
+          </p:style>
+          <p:txBody>
+            <a:bodyPr rtlCol="0" anchor="ctr"/>
+            <a:lstStyle/>
+            <a:p>
+              <a:pPr algn="ctr"/>
+              <a:r>
+                <a:rPr lang="en-US" sz="1200" dirty="0" smtClean="0">
+                  <a:solidFill>
+                    <a:sysClr val="windowText" lastClr="000000"/>
+                  </a:solidFill>
+                </a:rPr>
+                <a:t>1885</a:t>
+              </a:r>
+              <a:endParaRPr lang="en-US" sz="1200" dirty="0">
+                <a:solidFill>
+                  <a:sysClr val="windowText" lastClr="000000"/>
+                </a:solidFill>
+              </a:endParaRPr>
+            </a:p>
+          </p:txBody>
+        </p:sp>
+        <p:sp>
+          <p:nvSpPr>
+            <p:cNvPr id="17" name="Rectangle 16"/>
+            <p:cNvSpPr/>
+            <p:nvPr/>
+          </p:nvSpPr>
+          <p:spPr>
+            <a:xfrm>
+              <a:off x="6843631" y="3727094"/>
+              <a:ext cx="554916" cy="264965"/>
+            </a:xfrm>
+            <a:prstGeom prst="rect">
+              <a:avLst/>
+            </a:prstGeom>
+            <a:solidFill>
+              <a:srgbClr val="9FFC95"/>
+            </a:solidFill>
+            <a:ln>
+              <a:noFill/>
+            </a:ln>
+          </p:spPr>
+          <p:style>
+            <a:lnRef idx="2">
+              <a:schemeClr val="accent1">
+                <a:shade val="50000"/>
+              </a:schemeClr>
+            </a:lnRef>
+            <a:fillRef idx="1">
+              <a:schemeClr val="accent1"/>
+            </a:fillRef>
+            <a:effectRef idx="0">
+              <a:schemeClr val="accent1"/>
+            </a:effectRef>
+            <a:fontRef idx="minor">
+              <a:schemeClr val="lt1"/>
+            </a:fontRef>
+          </p:style>
+          <p:txBody>
+            <a:bodyPr rtlCol="0" anchor="ctr"/>
+            <a:lstStyle/>
+            <a:p>
+              <a:pPr algn="ctr"/>
+              <a:r>
+                <a:rPr lang="en-US" sz="1200" smtClean="0">
+                  <a:solidFill>
+                    <a:sysClr val="windowText" lastClr="000000"/>
+                  </a:solidFill>
+                </a:rPr>
+                <a:t>9137</a:t>
+              </a:r>
+              <a:endParaRPr lang="en-US" sz="1200" dirty="0">
+                <a:solidFill>
+                  <a:sysClr val="windowText" lastClr="000000"/>
+                </a:solidFill>
+              </a:endParaRPr>
+            </a:p>
+          </p:txBody>
+        </p:sp>
+        <p:sp>
+          <p:nvSpPr>
+            <p:cNvPr id="18" name="TextBox 17"/>
+            <p:cNvSpPr txBox="1"/>
+            <p:nvPr/>
+          </p:nvSpPr>
+          <p:spPr>
+            <a:xfrm>
+              <a:off x="7894262" y="3420452"/>
+              <a:ext cx="1243930" cy="646331"/>
+            </a:xfrm>
+            <a:prstGeom prst="rect">
+              <a:avLst/>
+            </a:prstGeom>
+            <a:noFill/>
+          </p:spPr>
+          <p:txBody>
+            <a:bodyPr wrap="none" rtlCol="0">
+              <a:spAutoFit/>
+            </a:bodyPr>
+            <a:lstStyle/>
+            <a:p>
+              <a:r>
+                <a:rPr lang="en-US" sz="1200" dirty="0" err="1" smtClean="0"/>
+                <a:t>modENCODE</a:t>
+              </a:r>
+              <a:endParaRPr lang="en-US" sz="1200" dirty="0" smtClean="0"/>
+            </a:p>
+            <a:p>
+              <a:r>
+                <a:rPr lang="en-US" sz="1200" dirty="0" smtClean="0"/>
+                <a:t>White Pre-Pupae</a:t>
+              </a:r>
+            </a:p>
+            <a:p>
+              <a:r>
+                <a:rPr lang="en-US" sz="1200" dirty="0" err="1" smtClean="0"/>
+                <a:t>Gro</a:t>
+              </a:r>
+              <a:r>
+                <a:rPr lang="en-US" sz="1200" dirty="0" smtClean="0"/>
+                <a:t> </a:t>
+              </a:r>
+              <a:r>
+                <a:rPr lang="en-US" sz="1200" dirty="0" err="1" smtClean="0"/>
+                <a:t>ChIP</a:t>
+              </a:r>
+              <a:r>
+                <a:rPr lang="en-US" sz="1200" dirty="0" smtClean="0"/>
+                <a:t>-chip</a:t>
+              </a:r>
+              <a:endParaRPr lang="en-US" sz="1200" dirty="0"/>
+            </a:p>
+          </p:txBody>
+        </p:sp>
+      </p:grpSp>
+    </p:spTree>
+    <p:extLst>
+      <p:ext uri="{BB962C8B-B14F-4D97-AF65-F5344CB8AC3E}">
+        <p14:creationId xmlns:p14="http://schemas.microsoft.com/office/powerpoint/2010/main" val="2013756755"/>
+      </p:ext>
+    </p:extLst>
+  </p:cSld>
+  <p:clrMapOvr>
+    <a:masterClrMapping/>
+  </p:clrMapOvr>
+  <p:timing>
+    <p:tnLst>
+      <p:par>
+        <p:cTn id="1" dur="indefinite" restart="never" nodeType="tmRoot"/>
+      </p:par>
+    </p:tnLst>
+  </p:timing>
+</p:sld>
+</file>
+
+<file path=ppt/slides/slide12.xml><?xml version="1.0" encoding="utf-8"?>
+<p:sld xmlns:a="http://schemas.openxmlformats.org/drawingml/2006/main" xmlns:r="http://schemas.openxmlformats.org/officeDocument/2006/relationships" xmlns:p="http://schemas.openxmlformats.org/presentationml/2006/main">
+  <p:cSld>
+    <p:spTree>
+      <p:nvGrpSpPr>
+        <p:cNvPr id="1" name=""/>
+        <p:cNvGrpSpPr/>
+        <p:nvPr/>
+      </p:nvGrpSpPr>
+      <p:grpSpPr>
+        <a:xfrm>
+          <a:off x="0" y="0"/>
+          <a:ext cx="0" cy="0"/>
+          <a:chOff x="0" y="0"/>
+          <a:chExt cx="0" cy="0"/>
+        </a:xfrm>
+      </p:grpSpPr>
+      <p:sp>
+        <p:nvSpPr>
+          <p:cNvPr id="2" name="Title 1"/>
+          <p:cNvSpPr>
+            <a:spLocks noGrp="1"/>
+          </p:cNvSpPr>
+          <p:nvPr>
+            <p:ph type="title"/>
+          </p:nvPr>
+        </p:nvSpPr>
+        <p:spPr/>
+        <p:txBody>
+          <a:bodyPr/>
+          <a:lstStyle/>
+          <a:p>
+            <a:endParaRPr lang="en-US"/>
+          </a:p>
+        </p:txBody>
+      </p:sp>
+      <p:pic>
+        <p:nvPicPr>
+          <p:cNvPr id="4" name="Picture 3"/>
+          <p:cNvPicPr>
+            <a:picLocks noChangeAspect="1"/>
+          </p:cNvPicPr>
+          <p:nvPr/>
+        </p:nvPicPr>
+        <p:blipFill rotWithShape="1">
+          <a:blip r:embed="rId2">
+            <a:extLst>
+              <a:ext uri="{28A0092B-C50C-407E-A947-70E740481C1C}">
+                <a14:useLocalDpi xmlns:a14="http://schemas.microsoft.com/office/drawing/2010/main" val="0"/>
+              </a:ext>
+            </a:extLst>
+          </a:blip>
+          <a:srcRect r="14035"/>
+          <a:stretch/>
+        </p:blipFill>
+        <p:spPr>
+          <a:xfrm>
+            <a:off x="159487" y="2392325"/>
+            <a:ext cx="4866761" cy="3274828"/>
+          </a:xfrm>
+          <a:prstGeom prst="rect">
+            <a:avLst/>
+          </a:prstGeom>
+        </p:spPr>
+      </p:pic>
+      <p:pic>
+        <p:nvPicPr>
+          <p:cNvPr id="37" name="Picture 36"/>
+          <p:cNvPicPr>
+            <a:picLocks noChangeAspect="1"/>
+          </p:cNvPicPr>
+          <p:nvPr/>
+        </p:nvPicPr>
+        <p:blipFill>
+          <a:blip r:embed="rId3">
+            <a:extLst>
+              <a:ext uri="{28A0092B-C50C-407E-A947-70E740481C1C}">
+                <a14:useLocalDpi xmlns:a14="http://schemas.microsoft.com/office/drawing/2010/main" val="0"/>
+              </a:ext>
+            </a:extLst>
+          </a:blip>
+          <a:stretch>
+            <a:fillRect/>
+          </a:stretch>
+        </p:blipFill>
+        <p:spPr>
+          <a:xfrm>
+            <a:off x="5192051" y="1446027"/>
+            <a:ext cx="3323299" cy="4221126"/>
+          </a:xfrm>
+          <a:prstGeom prst="rect">
+            <a:avLst/>
+          </a:prstGeom>
+        </p:spPr>
+      </p:pic>
+    </p:spTree>
+    <p:extLst>
+      <p:ext uri="{BB962C8B-B14F-4D97-AF65-F5344CB8AC3E}">
+        <p14:creationId xmlns:p14="http://schemas.microsoft.com/office/powerpoint/2010/main" val="765951463"/>
+      </p:ext>
+    </p:extLst>
+  </p:cSld>
+  <p:clrMapOvr>
+    <a:masterClrMapping/>
+  </p:clrMapOvr>
+  <p:timing>
+    <p:tnLst>
+      <p:par>
+        <p:cTn id="1" dur="indefinite" restart="never" nodeType="tmRoot"/>
+      </p:par>
+    </p:tnLst>
+  </p:timing>
+</p:sld>
+</file>
+
+<file path=ppt/slides/slide13.xml><?xml version="1.0" encoding="utf-8"?>
+<p:sld xmlns:a="http://schemas.openxmlformats.org/drawingml/2006/main" xmlns:r="http://schemas.openxmlformats.org/officeDocument/2006/relationships" xmlns:p="http://schemas.openxmlformats.org/presentationml/2006/main">
+  <p:cSld>
+    <p:spTree>
+      <p:nvGrpSpPr>
+        <p:cNvPr id="1" name=""/>
+        <p:cNvGrpSpPr/>
+        <p:nvPr/>
+      </p:nvGrpSpPr>
+      <p:grpSpPr>
+        <a:xfrm>
+          <a:off x="0" y="0"/>
+          <a:ext cx="0" cy="0"/>
+          <a:chOff x="0" y="0"/>
+          <a:chExt cx="0" cy="0"/>
+        </a:xfrm>
+      </p:grpSpPr>
+      <p:sp>
+        <p:nvSpPr>
+          <p:cNvPr id="2" name="Title 1"/>
+          <p:cNvSpPr>
+            <a:spLocks noGrp="1"/>
+          </p:cNvSpPr>
+          <p:nvPr>
+            <p:ph type="title"/>
+          </p:nvPr>
+        </p:nvSpPr>
+        <p:spPr/>
+        <p:txBody>
+          <a:bodyPr/>
+          <a:lstStyle/>
+          <a:p>
+            <a:endParaRPr lang="en-US"/>
+          </a:p>
+        </p:txBody>
+      </p:sp>
+      <p:pic>
+        <p:nvPicPr>
+          <p:cNvPr id="4" name="Picture 3"/>
+          <p:cNvPicPr>
+            <a:picLocks noChangeAspect="1"/>
+          </p:cNvPicPr>
+          <p:nvPr/>
+        </p:nvPicPr>
+        <p:blipFill>
+          <a:blip r:embed="rId2">
+            <a:extLst>
+              <a:ext uri="{28A0092B-C50C-407E-A947-70E740481C1C}">
+                <a14:useLocalDpi xmlns:a14="http://schemas.microsoft.com/office/drawing/2010/main" val="0"/>
+              </a:ext>
+            </a:extLst>
+          </a:blip>
+          <a:stretch>
+            <a:fillRect/>
+          </a:stretch>
+        </p:blipFill>
+        <p:spPr>
+          <a:xfrm>
+            <a:off x="1037121" y="2359393"/>
+            <a:ext cx="6361602" cy="3679901"/>
+          </a:xfrm>
+          <a:prstGeom prst="rect">
+            <a:avLst/>
+          </a:prstGeom>
+        </p:spPr>
+      </p:pic>
+      <p:sp>
+        <p:nvSpPr>
+          <p:cNvPr id="5" name="TextBox 4"/>
+          <p:cNvSpPr txBox="1"/>
+          <p:nvPr/>
+        </p:nvSpPr>
+        <p:spPr>
+          <a:xfrm>
+            <a:off x="1651355" y="5488518"/>
+            <a:ext cx="303552" cy="246221"/>
+          </a:xfrm>
+          <a:prstGeom prst="rect">
+            <a:avLst/>
+          </a:prstGeom>
+          <a:noFill/>
+        </p:spPr>
+        <p:txBody>
+          <a:bodyPr wrap="square" rtlCol="0">
+            <a:spAutoFit/>
+          </a:bodyPr>
+          <a:lstStyle/>
+          <a:p>
+            <a:r>
+              <a:rPr lang="en-US" sz="1000" dirty="0" smtClean="0"/>
+              <a:t>1</a:t>
+            </a:r>
+            <a:endParaRPr lang="en-US" sz="1000" dirty="0"/>
+          </a:p>
+        </p:txBody>
+      </p:sp>
+      <p:sp>
+        <p:nvSpPr>
+          <p:cNvPr id="6" name="TextBox 5"/>
+          <p:cNvSpPr txBox="1"/>
+          <p:nvPr/>
+        </p:nvSpPr>
+        <p:spPr>
+          <a:xfrm>
+            <a:off x="1785358" y="5488518"/>
+            <a:ext cx="303552" cy="246221"/>
+          </a:xfrm>
+          <a:prstGeom prst="rect">
+            <a:avLst/>
+          </a:prstGeom>
+          <a:noFill/>
+        </p:spPr>
+        <p:txBody>
+          <a:bodyPr wrap="square" rtlCol="0">
+            <a:spAutoFit/>
+          </a:bodyPr>
+          <a:lstStyle/>
+          <a:p>
+            <a:r>
+              <a:rPr lang="en-US" sz="1000" smtClean="0"/>
+              <a:t>2</a:t>
+            </a:r>
+            <a:endParaRPr lang="en-US" sz="1000" dirty="0"/>
+          </a:p>
+        </p:txBody>
+      </p:sp>
+      <p:sp>
+        <p:nvSpPr>
+          <p:cNvPr id="7" name="TextBox 6"/>
+          <p:cNvSpPr txBox="1"/>
+          <p:nvPr/>
+        </p:nvSpPr>
+        <p:spPr>
+          <a:xfrm>
+            <a:off x="1919361" y="5488518"/>
+            <a:ext cx="303552" cy="246221"/>
+          </a:xfrm>
+          <a:prstGeom prst="rect">
+            <a:avLst/>
+          </a:prstGeom>
+          <a:noFill/>
+        </p:spPr>
+        <p:txBody>
+          <a:bodyPr wrap="square" rtlCol="0">
+            <a:spAutoFit/>
+          </a:bodyPr>
+          <a:lstStyle/>
+          <a:p>
+            <a:r>
+              <a:rPr lang="en-US" sz="1000" dirty="0"/>
+              <a:t>3</a:t>
+            </a:r>
+          </a:p>
+        </p:txBody>
+      </p:sp>
+      <p:sp>
+        <p:nvSpPr>
+          <p:cNvPr id="8" name="TextBox 7"/>
+          <p:cNvSpPr txBox="1"/>
+          <p:nvPr/>
+        </p:nvSpPr>
+        <p:spPr>
+          <a:xfrm>
+            <a:off x="2053364" y="5488518"/>
+            <a:ext cx="303552" cy="246221"/>
+          </a:xfrm>
+          <a:prstGeom prst="rect">
+            <a:avLst/>
+          </a:prstGeom>
+          <a:noFill/>
+        </p:spPr>
+        <p:txBody>
+          <a:bodyPr wrap="square" rtlCol="0">
+            <a:spAutoFit/>
+          </a:bodyPr>
+          <a:lstStyle/>
+          <a:p>
+            <a:r>
+              <a:rPr lang="en-US" sz="1000" dirty="0" smtClean="0"/>
+              <a:t>4</a:t>
+            </a:r>
+            <a:endParaRPr lang="en-US" sz="1000" dirty="0"/>
+          </a:p>
+        </p:txBody>
+      </p:sp>
+      <p:sp>
+        <p:nvSpPr>
+          <p:cNvPr id="9" name="TextBox 8"/>
+          <p:cNvSpPr txBox="1"/>
+          <p:nvPr/>
+        </p:nvSpPr>
+        <p:spPr>
+          <a:xfrm>
+            <a:off x="2187367" y="5488518"/>
+            <a:ext cx="303552" cy="246221"/>
+          </a:xfrm>
+          <a:prstGeom prst="rect">
+            <a:avLst/>
+          </a:prstGeom>
+          <a:noFill/>
+        </p:spPr>
+        <p:txBody>
+          <a:bodyPr wrap="square" rtlCol="0">
+            <a:spAutoFit/>
+          </a:bodyPr>
+          <a:lstStyle/>
+          <a:p>
+            <a:r>
+              <a:rPr lang="en-US" sz="1000" dirty="0" smtClean="0"/>
+              <a:t>5</a:t>
+            </a:r>
+            <a:endParaRPr lang="en-US" sz="1000" dirty="0"/>
+          </a:p>
+        </p:txBody>
+      </p:sp>
+    </p:spTree>
+    <p:extLst>
+      <p:ext uri="{BB962C8B-B14F-4D97-AF65-F5344CB8AC3E}">
+        <p14:creationId xmlns:p14="http://schemas.microsoft.com/office/powerpoint/2010/main" val="1677184986"/>
+      </p:ext>
+    </p:extLst>
+  </p:cSld>
+  <p:clrMapOvr>
+    <a:masterClrMapping/>
+  </p:clrMapOvr>
+  <p:timing>
+    <p:tnLst>
+      <p:par>
+        <p:cTn id="1" dur="indefinite" restart="never" nodeType="tmRoot"/>
+      </p:par>
+    </p:tnLst>
+  </p:timing>
+</p:sld>
+</file>
+
+<file path=ppt/slides/slide14.xml><?xml version="1.0" encoding="utf-8"?>
+<p:sld xmlns:a="http://schemas.openxmlformats.org/drawingml/2006/main" xmlns:r="http://schemas.openxmlformats.org/officeDocument/2006/relationships" xmlns:p="http://schemas.openxmlformats.org/presentationml/2006/main">
+  <p:cSld>
+    <p:spTree>
+      <p:nvGrpSpPr>
+        <p:cNvPr id="1" name=""/>
+        <p:cNvGrpSpPr/>
+        <p:nvPr/>
+      </p:nvGrpSpPr>
+      <p:grpSpPr>
+        <a:xfrm>
+          <a:off x="0" y="0"/>
+          <a:ext cx="0" cy="0"/>
+          <a:chOff x="0" y="0"/>
+          <a:chExt cx="0" cy="0"/>
+        </a:xfrm>
+      </p:grpSpPr>
+      <p:sp>
+        <p:nvSpPr>
+          <p:cNvPr id="2" name="Title 1"/>
+          <p:cNvSpPr>
+            <a:spLocks noGrp="1"/>
+          </p:cNvSpPr>
+          <p:nvPr>
+            <p:ph type="title"/>
+          </p:nvPr>
+        </p:nvSpPr>
+        <p:spPr/>
+        <p:txBody>
+          <a:bodyPr/>
+          <a:lstStyle/>
+          <a:p>
+            <a:endParaRPr lang="en-US"/>
+          </a:p>
+        </p:txBody>
+      </p:sp>
+      <p:grpSp>
+        <p:nvGrpSpPr>
+          <p:cNvPr id="18" name="Group 17"/>
+          <p:cNvGrpSpPr/>
+          <p:nvPr/>
+        </p:nvGrpSpPr>
+        <p:grpSpPr>
+          <a:xfrm>
+            <a:off x="2274592" y="1888069"/>
+            <a:ext cx="3051298" cy="4440311"/>
+            <a:chOff x="1790498" y="1888069"/>
+            <a:chExt cx="3051298" cy="4440311"/>
+          </a:xfrm>
+        </p:grpSpPr>
+        <p:grpSp>
+          <p:nvGrpSpPr>
+            <p:cNvPr id="11" name="Group 10"/>
+            <p:cNvGrpSpPr/>
+            <p:nvPr/>
+          </p:nvGrpSpPr>
+          <p:grpSpPr>
+            <a:xfrm>
+              <a:off x="1928405" y="1888069"/>
+              <a:ext cx="2913391" cy="4440311"/>
+              <a:chOff x="2023583" y="2299130"/>
+              <a:chExt cx="2913391" cy="4440311"/>
+            </a:xfrm>
+          </p:grpSpPr>
+          <p:pic>
+            <p:nvPicPr>
+              <p:cNvPr id="4" name="Picture 3"/>
+              <p:cNvPicPr>
+                <a:picLocks noChangeAspect="1"/>
+              </p:cNvPicPr>
+              <p:nvPr/>
+            </p:nvPicPr>
+            <p:blipFill rotWithShape="1">
+              <a:blip r:embed="rId3">
+                <a:extLst>
+                  <a:ext uri="{28A0092B-C50C-407E-A947-70E740481C1C}">
+                    <a14:useLocalDpi xmlns:a14="http://schemas.microsoft.com/office/drawing/2010/main" val="0"/>
+                  </a:ext>
+                </a:extLst>
+              </a:blip>
+              <a:srcRect l="31780" t="4180" b="3823"/>
+              <a:stretch/>
+            </p:blipFill>
+            <p:spPr>
+              <a:xfrm>
+                <a:off x="2583662" y="2299130"/>
+                <a:ext cx="2353312" cy="3920194"/>
+              </a:xfrm>
+              <a:prstGeom prst="rect">
+                <a:avLst/>
+              </a:prstGeom>
+            </p:spPr>
+          </p:pic>
+          <p:pic>
+            <p:nvPicPr>
+              <p:cNvPr id="5" name="Picture 4"/>
+              <p:cNvPicPr>
+                <a:picLocks noChangeAspect="1"/>
+              </p:cNvPicPr>
+              <p:nvPr/>
+            </p:nvPicPr>
+            <p:blipFill rotWithShape="1">
+              <a:blip r:embed="rId3">
+                <a:extLst>
+                  <a:ext uri="{28A0092B-C50C-407E-A947-70E740481C1C}">
+                    <a14:useLocalDpi xmlns:a14="http://schemas.microsoft.com/office/drawing/2010/main" val="0"/>
+                  </a:ext>
+                </a:extLst>
+              </a:blip>
+              <a:srcRect l="-1150" t="4180" r="88185" b="3823"/>
+              <a:stretch/>
+            </p:blipFill>
+            <p:spPr>
+              <a:xfrm>
+                <a:off x="2136401" y="2299130"/>
+                <a:ext cx="447261" cy="3920194"/>
+              </a:xfrm>
+              <a:prstGeom prst="rect">
+                <a:avLst/>
+              </a:prstGeom>
+            </p:spPr>
+          </p:pic>
+          <p:sp>
+            <p:nvSpPr>
+              <p:cNvPr id="6" name="Rectangle 5"/>
+              <p:cNvSpPr/>
+              <p:nvPr/>
+            </p:nvSpPr>
+            <p:spPr>
+              <a:xfrm>
+                <a:off x="2023583" y="2404882"/>
+                <a:ext cx="436146" cy="3683523"/>
+              </a:xfrm>
+              <a:prstGeom prst="rect">
+                <a:avLst/>
+              </a:prstGeom>
+              <a:solidFill>
+                <a:schemeClr val="bg1"/>
+              </a:solidFill>
+              <a:ln>
+                <a:noFill/>
+              </a:ln>
+            </p:spPr>
+            <p:style>
+              <a:lnRef idx="2">
+                <a:schemeClr val="accent1">
+                  <a:shade val="50000"/>
+                </a:schemeClr>
+              </a:lnRef>
+              <a:fillRef idx="1">
+                <a:schemeClr val="accent1"/>
+              </a:fillRef>
+              <a:effectRef idx="0">
+                <a:schemeClr val="accent1"/>
+              </a:effectRef>
+              <a:fontRef idx="minor">
+                <a:schemeClr val="lt1"/>
+              </a:fontRef>
+            </p:style>
+            <p:txBody>
+              <a:bodyPr rtlCol="0" anchor="ctr"/>
+              <a:lstStyle/>
+              <a:p>
+                <a:pPr algn="ctr"/>
+                <a:endParaRPr lang="en-US"/>
+              </a:p>
+            </p:txBody>
+          </p:sp>
+          <p:sp>
+            <p:nvSpPr>
+              <p:cNvPr id="7" name="Rectangle 6"/>
+              <p:cNvSpPr/>
+              <p:nvPr/>
+            </p:nvSpPr>
+            <p:spPr>
+              <a:xfrm>
+                <a:off x="2709430" y="6194157"/>
+                <a:ext cx="1912904" cy="545284"/>
+              </a:xfrm>
+              <a:prstGeom prst="rect">
+                <a:avLst/>
+              </a:prstGeom>
+              <a:solidFill>
+                <a:schemeClr val="bg1"/>
+              </a:solidFill>
+              <a:ln>
+                <a:noFill/>
+              </a:ln>
+            </p:spPr>
+            <p:style>
+              <a:lnRef idx="2">
+                <a:schemeClr val="accent1">
+                  <a:shade val="50000"/>
+                </a:schemeClr>
+              </a:lnRef>
+              <a:fillRef idx="1">
+                <a:schemeClr val="accent1"/>
+              </a:fillRef>
+              <a:effectRef idx="0">
+                <a:schemeClr val="accent1"/>
+              </a:effectRef>
+              <a:fontRef idx="minor">
+                <a:schemeClr val="lt1"/>
+              </a:fontRef>
+            </p:style>
+            <p:txBody>
+              <a:bodyPr rtlCol="0" anchor="ctr"/>
+              <a:lstStyle/>
+              <a:p>
+                <a:pPr algn="ctr"/>
+                <a:endParaRPr lang="en-US"/>
+              </a:p>
+            </p:txBody>
+          </p:sp>
+        </p:grpSp>
+        <p:sp>
+          <p:nvSpPr>
+            <p:cNvPr id="8" name="TextBox 7"/>
+            <p:cNvSpPr txBox="1"/>
+            <p:nvPr/>
+          </p:nvSpPr>
+          <p:spPr>
+            <a:xfrm rot="18900000">
+              <a:off x="2139759" y="5927810"/>
+              <a:ext cx="939681" cy="307777"/>
+            </a:xfrm>
+            <a:prstGeom prst="rect">
+              <a:avLst/>
+            </a:prstGeom>
+            <a:noFill/>
+          </p:spPr>
+          <p:txBody>
+            <a:bodyPr wrap="none" rtlCol="0">
+              <a:spAutoFit/>
+            </a:bodyPr>
+            <a:lstStyle/>
+            <a:p>
+              <a:r>
+                <a:rPr lang="en-US" sz="1400" dirty="0" smtClean="0">
+                  <a:latin typeface="Helvetica" charset="0"/>
+                  <a:ea typeface="Helvetica" charset="0"/>
+                  <a:cs typeface="Helvetica" charset="0"/>
+                </a:rPr>
+                <a:t>1.5 – 4 </a:t>
+              </a:r>
+              <a:r>
+                <a:rPr lang="en-US" sz="1400" dirty="0" err="1" smtClean="0">
+                  <a:latin typeface="Helvetica" charset="0"/>
+                  <a:ea typeface="Helvetica" charset="0"/>
+                  <a:cs typeface="Helvetica" charset="0"/>
+                </a:rPr>
+                <a:t>hr</a:t>
+              </a:r>
+              <a:endParaRPr lang="en-US" sz="1400" dirty="0">
+                <a:latin typeface="Helvetica" charset="0"/>
+                <a:ea typeface="Helvetica" charset="0"/>
+                <a:cs typeface="Helvetica" charset="0"/>
+              </a:endParaRPr>
+            </a:p>
+          </p:txBody>
+        </p:sp>
+        <p:sp>
+          <p:nvSpPr>
+            <p:cNvPr id="9" name="TextBox 8"/>
+            <p:cNvSpPr txBox="1"/>
+            <p:nvPr/>
+          </p:nvSpPr>
+          <p:spPr>
+            <a:xfrm rot="18900000">
+              <a:off x="2878830" y="5927810"/>
+              <a:ext cx="939681" cy="307777"/>
+            </a:xfrm>
+            <a:prstGeom prst="rect">
+              <a:avLst/>
+            </a:prstGeom>
+            <a:noFill/>
+          </p:spPr>
+          <p:txBody>
+            <a:bodyPr wrap="none" rtlCol="0">
+              <a:spAutoFit/>
+            </a:bodyPr>
+            <a:lstStyle/>
+            <a:p>
+              <a:r>
+                <a:rPr lang="en-US" sz="1400" dirty="0" smtClean="0">
+                  <a:latin typeface="Helvetica" charset="0"/>
+                  <a:ea typeface="Helvetica" charset="0"/>
+                  <a:cs typeface="Helvetica" charset="0"/>
+                </a:rPr>
+                <a:t>4 – 6.5 </a:t>
+              </a:r>
+              <a:r>
+                <a:rPr lang="en-US" sz="1400" dirty="0" err="1" smtClean="0">
+                  <a:latin typeface="Helvetica" charset="0"/>
+                  <a:ea typeface="Helvetica" charset="0"/>
+                  <a:cs typeface="Helvetica" charset="0"/>
+                </a:rPr>
+                <a:t>hr</a:t>
+              </a:r>
+              <a:endParaRPr lang="en-US" sz="1400" dirty="0">
+                <a:latin typeface="Helvetica" charset="0"/>
+                <a:ea typeface="Helvetica" charset="0"/>
+                <a:cs typeface="Helvetica" charset="0"/>
+              </a:endParaRPr>
+            </a:p>
+          </p:txBody>
+        </p:sp>
+        <p:sp>
+          <p:nvSpPr>
+            <p:cNvPr id="10" name="TextBox 9"/>
+            <p:cNvSpPr txBox="1"/>
+            <p:nvPr/>
+          </p:nvSpPr>
+          <p:spPr>
+            <a:xfrm rot="18900000">
+              <a:off x="3639419" y="5913641"/>
+              <a:ext cx="899605" cy="307777"/>
+            </a:xfrm>
+            <a:prstGeom prst="rect">
+              <a:avLst/>
+            </a:prstGeom>
+            <a:noFill/>
+          </p:spPr>
+          <p:txBody>
+            <a:bodyPr wrap="none" rtlCol="0">
+              <a:spAutoFit/>
+            </a:bodyPr>
+            <a:lstStyle/>
+            <a:p>
+              <a:r>
+                <a:rPr lang="en-US" sz="1400" dirty="0" smtClean="0">
+                  <a:latin typeface="Helvetica" charset="0"/>
+                  <a:ea typeface="Helvetica" charset="0"/>
+                  <a:cs typeface="Helvetica" charset="0"/>
+                </a:rPr>
+                <a:t>6.5 - 9 </a:t>
+              </a:r>
+              <a:r>
+                <a:rPr lang="en-US" sz="1400" dirty="0" err="1" smtClean="0">
+                  <a:latin typeface="Helvetica" charset="0"/>
+                  <a:ea typeface="Helvetica" charset="0"/>
+                  <a:cs typeface="Helvetica" charset="0"/>
+                </a:rPr>
+                <a:t>hr</a:t>
+              </a:r>
+              <a:endParaRPr lang="en-US" sz="1400" dirty="0">
+                <a:latin typeface="Helvetica" charset="0"/>
+                <a:ea typeface="Helvetica" charset="0"/>
+                <a:cs typeface="Helvetica" charset="0"/>
+              </a:endParaRPr>
+            </a:p>
+          </p:txBody>
+        </p:sp>
+        <p:sp>
+          <p:nvSpPr>
+            <p:cNvPr id="12" name="TextBox 11"/>
+            <p:cNvSpPr txBox="1"/>
+            <p:nvPr/>
+          </p:nvSpPr>
+          <p:spPr>
+            <a:xfrm>
+              <a:off x="2064612" y="5410623"/>
+              <a:ext cx="393056" cy="307777"/>
+            </a:xfrm>
+            <a:prstGeom prst="rect">
+              <a:avLst/>
+            </a:prstGeom>
+            <a:noFill/>
+          </p:spPr>
+          <p:txBody>
+            <a:bodyPr wrap="none" rtlCol="0">
+              <a:spAutoFit/>
+            </a:bodyPr>
+            <a:lstStyle/>
+            <a:p>
+              <a:r>
+                <a:rPr lang="en-US" sz="1400" dirty="0" smtClean="0">
+                  <a:latin typeface="Helvetica" charset="0"/>
+                  <a:ea typeface="Helvetica" charset="0"/>
+                  <a:cs typeface="Helvetica" charset="0"/>
+                </a:rPr>
+                <a:t>0 -</a:t>
+              </a:r>
+              <a:endParaRPr lang="en-US" sz="1400" dirty="0">
+                <a:latin typeface="Helvetica" charset="0"/>
+                <a:ea typeface="Helvetica" charset="0"/>
+                <a:cs typeface="Helvetica" charset="0"/>
+              </a:endParaRPr>
+            </a:p>
+          </p:txBody>
+        </p:sp>
+        <p:sp>
+          <p:nvSpPr>
+            <p:cNvPr id="13" name="TextBox 12"/>
+            <p:cNvSpPr txBox="1"/>
+            <p:nvPr/>
+          </p:nvSpPr>
+          <p:spPr>
+            <a:xfrm>
+              <a:off x="1881869" y="4710424"/>
+              <a:ext cx="591829" cy="307777"/>
+            </a:xfrm>
+            <a:prstGeom prst="rect">
+              <a:avLst/>
+            </a:prstGeom>
+            <a:noFill/>
+          </p:spPr>
+          <p:txBody>
+            <a:bodyPr wrap="none" rtlCol="0">
+              <a:spAutoFit/>
+            </a:bodyPr>
+            <a:lstStyle/>
+            <a:p>
+              <a:r>
+                <a:rPr lang="en-US" sz="1400" dirty="0" smtClean="0">
+                  <a:latin typeface="Helvetica" charset="0"/>
+                  <a:ea typeface="Helvetica" charset="0"/>
+                  <a:cs typeface="Helvetica" charset="0"/>
+                </a:rPr>
+                <a:t>500 -</a:t>
+              </a:r>
+              <a:endParaRPr lang="en-US" sz="1400" dirty="0">
+                <a:latin typeface="Helvetica" charset="0"/>
+                <a:ea typeface="Helvetica" charset="0"/>
+                <a:cs typeface="Helvetica" charset="0"/>
+              </a:endParaRPr>
+            </a:p>
+          </p:txBody>
+        </p:sp>
+        <p:sp>
+          <p:nvSpPr>
+            <p:cNvPr id="14" name="TextBox 13"/>
+            <p:cNvSpPr txBox="1"/>
+            <p:nvPr/>
+          </p:nvSpPr>
+          <p:spPr>
+            <a:xfrm>
+              <a:off x="1790498" y="4006256"/>
+              <a:ext cx="691215" cy="307777"/>
+            </a:xfrm>
+            <a:prstGeom prst="rect">
+              <a:avLst/>
+            </a:prstGeom>
+            <a:noFill/>
+          </p:spPr>
+          <p:txBody>
+            <a:bodyPr wrap="none" rtlCol="0">
+              <a:spAutoFit/>
+            </a:bodyPr>
+            <a:lstStyle/>
+            <a:p>
+              <a:r>
+                <a:rPr lang="en-US" sz="1400" smtClean="0">
+                  <a:latin typeface="Helvetica" charset="0"/>
+                  <a:ea typeface="Helvetica" charset="0"/>
+                  <a:cs typeface="Helvetica" charset="0"/>
+                </a:rPr>
+                <a:t>1000 </a:t>
+              </a:r>
+              <a:r>
+                <a:rPr lang="en-US" sz="1400" dirty="0" smtClean="0">
+                  <a:latin typeface="Helvetica" charset="0"/>
+                  <a:ea typeface="Helvetica" charset="0"/>
+                  <a:cs typeface="Helvetica" charset="0"/>
+                </a:rPr>
+                <a:t>-</a:t>
+              </a:r>
+              <a:endParaRPr lang="en-US" sz="1400" dirty="0">
+                <a:latin typeface="Helvetica" charset="0"/>
+                <a:ea typeface="Helvetica" charset="0"/>
+                <a:cs typeface="Helvetica" charset="0"/>
+              </a:endParaRPr>
+            </a:p>
+          </p:txBody>
+        </p:sp>
+        <p:sp>
+          <p:nvSpPr>
+            <p:cNvPr id="15" name="TextBox 14"/>
+            <p:cNvSpPr txBox="1"/>
+            <p:nvPr/>
+          </p:nvSpPr>
+          <p:spPr>
+            <a:xfrm>
+              <a:off x="1790498" y="3304073"/>
+              <a:ext cx="691215" cy="307777"/>
+            </a:xfrm>
+            <a:prstGeom prst="rect">
+              <a:avLst/>
+            </a:prstGeom>
+            <a:noFill/>
+          </p:spPr>
+          <p:txBody>
+            <a:bodyPr wrap="none" rtlCol="0">
+              <a:spAutoFit/>
+            </a:bodyPr>
+            <a:lstStyle/>
+            <a:p>
+              <a:r>
+                <a:rPr lang="en-US" sz="1400" dirty="0" smtClean="0">
+                  <a:latin typeface="Helvetica" charset="0"/>
+                  <a:ea typeface="Helvetica" charset="0"/>
+                  <a:cs typeface="Helvetica" charset="0"/>
+                </a:rPr>
+                <a:t>1500 -</a:t>
+              </a:r>
+              <a:endParaRPr lang="en-US" sz="1400" dirty="0">
+                <a:latin typeface="Helvetica" charset="0"/>
+                <a:ea typeface="Helvetica" charset="0"/>
+                <a:cs typeface="Helvetica" charset="0"/>
+              </a:endParaRPr>
+            </a:p>
+          </p:txBody>
+        </p:sp>
+        <p:sp>
+          <p:nvSpPr>
+            <p:cNvPr id="16" name="TextBox 15"/>
+            <p:cNvSpPr txBox="1"/>
+            <p:nvPr/>
+          </p:nvSpPr>
+          <p:spPr>
+            <a:xfrm>
+              <a:off x="1790498" y="2599905"/>
+              <a:ext cx="691215" cy="307777"/>
+            </a:xfrm>
+            <a:prstGeom prst="rect">
+              <a:avLst/>
+            </a:prstGeom>
+            <a:noFill/>
+          </p:spPr>
+          <p:txBody>
+            <a:bodyPr wrap="none" rtlCol="0">
+              <a:spAutoFit/>
+            </a:bodyPr>
+            <a:lstStyle/>
+            <a:p>
+              <a:r>
+                <a:rPr lang="en-US" sz="1400" dirty="0" smtClean="0">
+                  <a:latin typeface="Helvetica" charset="0"/>
+                  <a:ea typeface="Helvetica" charset="0"/>
+                  <a:cs typeface="Helvetica" charset="0"/>
+                </a:rPr>
+                <a:t>2000 -</a:t>
+              </a:r>
+              <a:endParaRPr lang="en-US" sz="1400" dirty="0">
+                <a:latin typeface="Helvetica" charset="0"/>
+                <a:ea typeface="Helvetica" charset="0"/>
+                <a:cs typeface="Helvetica" charset="0"/>
+              </a:endParaRPr>
+            </a:p>
+          </p:txBody>
+        </p:sp>
+        <p:sp>
+          <p:nvSpPr>
+            <p:cNvPr id="17" name="TextBox 16"/>
+            <p:cNvSpPr txBox="1"/>
+            <p:nvPr/>
+          </p:nvSpPr>
+          <p:spPr>
+            <a:xfrm>
+              <a:off x="1790498" y="1896730"/>
+              <a:ext cx="691215" cy="307777"/>
+            </a:xfrm>
+            <a:prstGeom prst="rect">
+              <a:avLst/>
+            </a:prstGeom>
+            <a:noFill/>
+          </p:spPr>
+          <p:txBody>
+            <a:bodyPr wrap="none" rtlCol="0">
+              <a:spAutoFit/>
+            </a:bodyPr>
+            <a:lstStyle/>
+            <a:p>
+              <a:r>
+                <a:rPr lang="en-US" sz="1400" dirty="0" smtClean="0">
+                  <a:latin typeface="Helvetica" charset="0"/>
+                  <a:ea typeface="Helvetica" charset="0"/>
+                  <a:cs typeface="Helvetica" charset="0"/>
+                </a:rPr>
+                <a:t>2500 -</a:t>
+              </a:r>
+              <a:endParaRPr lang="en-US" sz="1400" dirty="0">
+                <a:latin typeface="Helvetica" charset="0"/>
+                <a:ea typeface="Helvetica" charset="0"/>
+                <a:cs typeface="Helvetica" charset="0"/>
+              </a:endParaRPr>
+            </a:p>
+          </p:txBody>
+        </p:sp>
+      </p:grpSp>
+    </p:spTree>
+    <p:extLst>
+      <p:ext uri="{BB962C8B-B14F-4D97-AF65-F5344CB8AC3E}">
+        <p14:creationId xmlns:p14="http://schemas.microsoft.com/office/powerpoint/2010/main" val="724771932"/>
+      </p:ext>
+    </p:extLst>
+  </p:cSld>
+  <p:clrMapOvr>
+    <a:masterClrMapping/>
+  </p:clrMapOvr>
+  <p:timing>
+    <p:tnLst>
+      <p:par>
+        <p:cTn id="1" dur="indefinite" restart="never" nodeType="tmRoot"/>
+      </p:par>
+    </p:tnLst>
+  </p:timing>
+</p:sld>
+</file>
+
+<file path=ppt/slides/slide15.xml><?xml version="1.0" encoding="utf-8"?>
+<p:sld xmlns:a="http://schemas.openxmlformats.org/drawingml/2006/main" xmlns:r="http://schemas.openxmlformats.org/officeDocument/2006/relationships" xmlns:p="http://schemas.openxmlformats.org/presentationml/2006/main">
+  <p:cSld>
+    <p:spTree>
+      <p:nvGrpSpPr>
+        <p:cNvPr id="1" name=""/>
+        <p:cNvGrpSpPr/>
+        <p:nvPr/>
+      </p:nvGrpSpPr>
+      <p:grpSpPr>
+        <a:xfrm>
+          <a:off x="0" y="0"/>
+          <a:ext cx="0" cy="0"/>
+          <a:chOff x="0" y="0"/>
+          <a:chExt cx="0" cy="0"/>
+        </a:xfrm>
+      </p:grpSpPr>
+      <p:sp>
+        <p:nvSpPr>
+          <p:cNvPr id="2" name="Title 1"/>
+          <p:cNvSpPr>
+            <a:spLocks noGrp="1"/>
+          </p:cNvSpPr>
+          <p:nvPr>
+            <p:ph type="title"/>
+          </p:nvPr>
+        </p:nvSpPr>
+        <p:spPr/>
+        <p:txBody>
+          <a:bodyPr/>
+          <a:lstStyle/>
+          <a:p>
+            <a:endParaRPr lang="en-US"/>
+          </a:p>
+        </p:txBody>
+      </p:sp>
+      <p:grpSp>
+        <p:nvGrpSpPr>
+          <p:cNvPr id="7" name="Group 6"/>
+          <p:cNvGrpSpPr/>
+          <p:nvPr/>
+        </p:nvGrpSpPr>
+        <p:grpSpPr>
+          <a:xfrm>
+            <a:off x="894530" y="2151529"/>
+            <a:ext cx="3502658" cy="1748118"/>
+            <a:chOff x="402561" y="5446058"/>
+            <a:chExt cx="3502658" cy="1748118"/>
+          </a:xfrm>
+        </p:grpSpPr>
+        <p:pic>
+          <p:nvPicPr>
+            <p:cNvPr id="5" name="Picture 4"/>
+            <p:cNvPicPr>
+              <a:picLocks noChangeAspect="1"/>
+            </p:cNvPicPr>
+            <p:nvPr/>
+          </p:nvPicPr>
+          <p:blipFill rotWithShape="1">
+            <a:blip r:embed="rId2">
+              <a:extLst>
+                <a:ext uri="{28A0092B-C50C-407E-A947-70E740481C1C}">
+                  <a14:useLocalDpi xmlns:a14="http://schemas.microsoft.com/office/drawing/2010/main" val="0"/>
+                </a:ext>
+              </a:extLst>
+            </a:blip>
+            <a:srcRect t="31956" r="42075" b="30488"/>
+            <a:stretch/>
+          </p:blipFill>
+          <p:spPr>
+            <a:xfrm>
+              <a:off x="416008" y="5446058"/>
+              <a:ext cx="3489211" cy="1748118"/>
+            </a:xfrm>
+            <a:prstGeom prst="rect">
+              <a:avLst/>
+            </a:prstGeom>
+          </p:spPr>
+        </p:pic>
+        <p:sp>
+          <p:nvSpPr>
+            <p:cNvPr id="6" name="Rectangle 5"/>
+            <p:cNvSpPr/>
+            <p:nvPr/>
+          </p:nvSpPr>
+          <p:spPr>
+            <a:xfrm>
+              <a:off x="402561" y="5739098"/>
+              <a:ext cx="277710" cy="645703"/>
+            </a:xfrm>
+            <a:prstGeom prst="rect">
+              <a:avLst/>
+            </a:prstGeom>
+            <a:solidFill>
+              <a:schemeClr val="bg1"/>
+            </a:solidFill>
+            <a:ln>
+              <a:noFill/>
+            </a:ln>
+          </p:spPr>
+          <p:style>
+            <a:lnRef idx="2">
+              <a:schemeClr val="accent1">
+                <a:shade val="50000"/>
+              </a:schemeClr>
+            </a:lnRef>
+            <a:fillRef idx="1">
+              <a:schemeClr val="accent1"/>
+            </a:fillRef>
+            <a:effectRef idx="0">
+              <a:schemeClr val="accent1"/>
+            </a:effectRef>
+            <a:fontRef idx="minor">
+              <a:schemeClr val="lt1"/>
+            </a:fontRef>
+          </p:style>
+          <p:txBody>
+            <a:bodyPr rtlCol="0" anchor="ctr"/>
+            <a:lstStyle/>
+            <a:p>
+              <a:pPr algn="ctr"/>
+              <a:endParaRPr lang="en-US"/>
+            </a:p>
+          </p:txBody>
+        </p:sp>
+      </p:grpSp>
+      <p:pic>
+        <p:nvPicPr>
+          <p:cNvPr id="8" name="Picture 7"/>
+          <p:cNvPicPr>
+            <a:picLocks noChangeAspect="1"/>
+          </p:cNvPicPr>
+          <p:nvPr/>
+        </p:nvPicPr>
+        <p:blipFill>
+          <a:blip r:embed="rId3">
+            <a:extLst>
+              <a:ext uri="{28A0092B-C50C-407E-A947-70E740481C1C}">
+                <a14:useLocalDpi xmlns:a14="http://schemas.microsoft.com/office/drawing/2010/main" val="0"/>
+              </a:ext>
+            </a:extLst>
+          </a:blip>
+          <a:stretch>
+            <a:fillRect/>
+          </a:stretch>
+        </p:blipFill>
+        <p:spPr>
+          <a:xfrm>
+            <a:off x="5411218" y="2021231"/>
+            <a:ext cx="3356264" cy="4343400"/>
+          </a:xfrm>
+          <a:prstGeom prst="rect">
+            <a:avLst/>
+          </a:prstGeom>
+        </p:spPr>
+      </p:pic>
+      <p:pic>
+        <p:nvPicPr>
+          <p:cNvPr id="10" name="Picture 9"/>
+          <p:cNvPicPr>
+            <a:picLocks noChangeAspect="1"/>
+          </p:cNvPicPr>
+          <p:nvPr/>
+        </p:nvPicPr>
+        <p:blipFill rotWithShape="1">
+          <a:blip r:embed="rId2">
+            <a:extLst>
+              <a:ext uri="{28A0092B-C50C-407E-A947-70E740481C1C}">
+                <a14:useLocalDpi xmlns:a14="http://schemas.microsoft.com/office/drawing/2010/main" val="0"/>
+              </a:ext>
+            </a:extLst>
+          </a:blip>
+          <a:srcRect l="57813" t="31956" b="30488"/>
+          <a:stretch/>
+        </p:blipFill>
+        <p:spPr>
+          <a:xfrm>
+            <a:off x="2030805" y="3899647"/>
+            <a:ext cx="2541195" cy="1748118"/>
+          </a:xfrm>
+          <a:prstGeom prst="rect">
+            <a:avLst/>
+          </a:prstGeom>
+        </p:spPr>
+      </p:pic>
+    </p:spTree>
+    <p:extLst>
+      <p:ext uri="{BB962C8B-B14F-4D97-AF65-F5344CB8AC3E}">
+        <p14:creationId xmlns:p14="http://schemas.microsoft.com/office/powerpoint/2010/main" val="1479257248"/>
+      </p:ext>
+    </p:extLst>
+  </p:cSld>
+  <p:clrMapOvr>
+    <a:masterClrMapping/>
+  </p:clrMapOvr>
+  <p:timing>
+    <p:tnLst>
+      <p:par>
+        <p:cTn id="1" dur="indefinite" restart="never" nodeType="tmRoot"/>
+      </p:par>
+    </p:tnLst>
+  </p:timing>
+</p:sld>
+</file>
+
+<file path=ppt/slides/slide16.xml><?xml version="1.0" encoding="utf-8"?>
+<p:sld xmlns:a="http://schemas.openxmlformats.org/drawingml/2006/main" xmlns:r="http://schemas.openxmlformats.org/officeDocument/2006/relationships" xmlns:p="http://schemas.openxmlformats.org/presentationml/2006/main">
+  <p:cSld>
+    <p:spTree>
+      <p:nvGrpSpPr>
+        <p:cNvPr id="1" name=""/>
+        <p:cNvGrpSpPr/>
+        <p:nvPr/>
+      </p:nvGrpSpPr>
+      <p:grpSpPr>
+        <a:xfrm>
+          <a:off x="0" y="0"/>
+          <a:ext cx="0" cy="0"/>
+          <a:chOff x="0" y="0"/>
+          <a:chExt cx="0" cy="0"/>
+        </a:xfrm>
+      </p:grpSpPr>
+      <p:sp>
+        <p:nvSpPr>
+          <p:cNvPr id="2" name="Title 1"/>
+          <p:cNvSpPr>
+            <a:spLocks noGrp="1"/>
+          </p:cNvSpPr>
+          <p:nvPr>
+            <p:ph type="title"/>
+          </p:nvPr>
+        </p:nvSpPr>
+        <p:spPr/>
+        <p:txBody>
+          <a:bodyPr/>
+          <a:lstStyle/>
+          <a:p>
+            <a:endParaRPr lang="en-US"/>
+          </a:p>
+        </p:txBody>
+      </p:sp>
+      <p:pic>
+        <p:nvPicPr>
+          <p:cNvPr id="4" name="Picture 3"/>
+          <p:cNvPicPr>
+            <a:picLocks noChangeAspect="1"/>
+          </p:cNvPicPr>
+          <p:nvPr/>
+        </p:nvPicPr>
+        <p:blipFill rotWithShape="1">
+          <a:blip r:embed="rId2">
+            <a:extLst>
+              <a:ext uri="{28A0092B-C50C-407E-A947-70E740481C1C}">
+                <a14:useLocalDpi xmlns:a14="http://schemas.microsoft.com/office/drawing/2010/main" val="0"/>
+              </a:ext>
+            </a:extLst>
+          </a:blip>
+          <a:srcRect r="20000"/>
+          <a:stretch/>
+        </p:blipFill>
+        <p:spPr>
+          <a:xfrm>
+            <a:off x="363070" y="365126"/>
+            <a:ext cx="6858000" cy="6050750"/>
+          </a:xfrm>
+          <a:prstGeom prst="rect">
+            <a:avLst/>
+          </a:prstGeom>
+        </p:spPr>
+      </p:pic>
+      <p:pic>
+        <p:nvPicPr>
+          <p:cNvPr id="5" name="Picture 4"/>
+          <p:cNvPicPr>
+            <a:picLocks noChangeAspect="1"/>
+          </p:cNvPicPr>
+          <p:nvPr/>
+        </p:nvPicPr>
+        <p:blipFill rotWithShape="1">
+          <a:blip r:embed="rId2">
+            <a:extLst>
+              <a:ext uri="{28A0092B-C50C-407E-A947-70E740481C1C}">
+                <a14:useLocalDpi xmlns:a14="http://schemas.microsoft.com/office/drawing/2010/main" val="0"/>
+              </a:ext>
+            </a:extLst>
+          </a:blip>
+          <a:srcRect l="79883" t="41192" b="43729"/>
+          <a:stretch/>
+        </p:blipFill>
+        <p:spPr>
+          <a:xfrm>
+            <a:off x="7307999" y="2904814"/>
+            <a:ext cx="1836001" cy="971373"/>
+          </a:xfrm>
+          <a:prstGeom prst="rect">
+            <a:avLst/>
+          </a:prstGeom>
+        </p:spPr>
+      </p:pic>
+    </p:spTree>
+    <p:extLst>
+      <p:ext uri="{BB962C8B-B14F-4D97-AF65-F5344CB8AC3E}">
+        <p14:creationId xmlns:p14="http://schemas.microsoft.com/office/powerpoint/2010/main" val="1740469617"/>
+      </p:ext>
+    </p:extLst>
+  </p:cSld>
+  <p:clrMapOvr>
+    <a:masterClrMapping/>
+  </p:clrMapOvr>
+  <p:timing>
+    <p:tnLst>
+      <p:par>
+        <p:cTn id="1" dur="indefinite" restart="never" nodeType="tmRoot"/>
+      </p:par>
+    </p:tnLst>
+  </p:timing>
+</p:sld>
+</file>
+
+<file path=ppt/slides/slide17.xml><?xml version="1.0" encoding="utf-8"?>
+<p:sld xmlns:a="http://schemas.openxmlformats.org/drawingml/2006/main" xmlns:r="http://schemas.openxmlformats.org/officeDocument/2006/relationships" xmlns:p="http://schemas.openxmlformats.org/presentationml/2006/main">
+  <p:cSld>
+    <p:spTree>
+      <p:nvGrpSpPr>
+        <p:cNvPr id="1" name=""/>
+        <p:cNvGrpSpPr/>
+        <p:nvPr/>
+      </p:nvGrpSpPr>
+      <p:grpSpPr>
+        <a:xfrm>
+          <a:off x="0" y="0"/>
+          <a:ext cx="0" cy="0"/>
+          <a:chOff x="0" y="0"/>
+          <a:chExt cx="0" cy="0"/>
+        </a:xfrm>
+      </p:grpSpPr>
+      <p:sp>
+        <p:nvSpPr>
+          <p:cNvPr id="2" name="Title 1"/>
+          <p:cNvSpPr>
+            <a:spLocks noGrp="1"/>
+          </p:cNvSpPr>
+          <p:nvPr>
+            <p:ph type="title"/>
+          </p:nvPr>
+        </p:nvSpPr>
+        <p:spPr/>
+        <p:txBody>
+          <a:bodyPr/>
+          <a:lstStyle/>
+          <a:p>
+            <a:endParaRPr lang="en-US"/>
+          </a:p>
+        </p:txBody>
+      </p:sp>
+      <p:pic>
+        <p:nvPicPr>
+          <p:cNvPr id="4" name="Picture 3"/>
+          <p:cNvPicPr>
+            <a:picLocks noChangeAspect="1"/>
+          </p:cNvPicPr>
+          <p:nvPr/>
+        </p:nvPicPr>
+        <p:blipFill>
+          <a:blip r:embed="rId2">
+            <a:extLst>
+              <a:ext uri="{28A0092B-C50C-407E-A947-70E740481C1C}">
+                <a14:useLocalDpi xmlns:a14="http://schemas.microsoft.com/office/drawing/2010/main" val="0"/>
+              </a:ext>
+            </a:extLst>
+          </a:blip>
+          <a:stretch>
+            <a:fillRect/>
+          </a:stretch>
+        </p:blipFill>
+        <p:spPr>
+          <a:xfrm>
+            <a:off x="2206612" y="2395066"/>
+            <a:ext cx="6680007" cy="3864083"/>
+          </a:xfrm>
+          <a:prstGeom prst="rect">
+            <a:avLst/>
+          </a:prstGeom>
+        </p:spPr>
+      </p:pic>
+    </p:spTree>
+    <p:extLst>
+      <p:ext uri="{BB962C8B-B14F-4D97-AF65-F5344CB8AC3E}">
+        <p14:creationId xmlns:p14="http://schemas.microsoft.com/office/powerpoint/2010/main" val="635494006"/>
+      </p:ext>
+    </p:extLst>
+  </p:cSld>
+  <p:clrMapOvr>
+    <a:masterClrMapping/>
+  </p:clrMapOvr>
+  <p:timing>
+    <p:tnLst>
+      <p:par>
+        <p:cTn id="1" dur="indefinite" restart="never" nodeType="tmRoot"/>
+      </p:par>
+    </p:tnLst>
+  </p:timing>
+</p:sld>
+</file>
+
+<file path=ppt/slides/slide18.xml><?xml version="1.0" encoding="utf-8"?>
+<p:sld xmlns:a="http://schemas.openxmlformats.org/drawingml/2006/main" xmlns:r="http://schemas.openxmlformats.org/officeDocument/2006/relationships" xmlns:p="http://schemas.openxmlformats.org/presentationml/2006/main">
+  <p:cSld>
+    <p:spTree>
+      <p:nvGrpSpPr>
+        <p:cNvPr id="1" name=""/>
+        <p:cNvGrpSpPr/>
+        <p:nvPr/>
+      </p:nvGrpSpPr>
+      <p:grpSpPr>
+        <a:xfrm>
+          <a:off x="0" y="0"/>
+          <a:ext cx="0" cy="0"/>
+          <a:chOff x="0" y="0"/>
+          <a:chExt cx="0" cy="0"/>
+        </a:xfrm>
+      </p:grpSpPr>
+      <p:sp>
+        <p:nvSpPr>
+          <p:cNvPr id="2" name="Title 1"/>
+          <p:cNvSpPr>
+            <a:spLocks noGrp="1"/>
+          </p:cNvSpPr>
+          <p:nvPr>
+            <p:ph type="title"/>
+          </p:nvPr>
+        </p:nvSpPr>
+        <p:spPr/>
+        <p:txBody>
+          <a:bodyPr/>
+          <a:lstStyle/>
+          <a:p>
+            <a:endParaRPr lang="en-US"/>
+          </a:p>
+        </p:txBody>
+      </p:sp>
+      <p:pic>
+        <p:nvPicPr>
+          <p:cNvPr id="4" name="Picture 3" descr="Screen Shot 2015-02-24 at 8.55.51 PM.png"/>
+          <p:cNvPicPr>
+            <a:picLocks noChangeAspect="1"/>
+          </p:cNvPicPr>
+          <p:nvPr/>
+        </p:nvPicPr>
+        <p:blipFill>
+          <a:blip r:embed="rId2">
+            <a:extLst>
+              <a:ext uri="{28A0092B-C50C-407E-A947-70E740481C1C}">
+                <a14:useLocalDpi xmlns:a14="http://schemas.microsoft.com/office/drawing/2010/main" val="0"/>
+              </a:ext>
+            </a:extLst>
+          </a:blip>
+          <a:stretch>
+            <a:fillRect/>
+          </a:stretch>
+        </p:blipFill>
+        <p:spPr>
+          <a:xfrm>
+            <a:off x="429995" y="3248526"/>
+            <a:ext cx="4411256" cy="1649508"/>
+          </a:xfrm>
+          <a:prstGeom prst="rect">
+            <a:avLst/>
+          </a:prstGeom>
+        </p:spPr>
+      </p:pic>
+      <p:pic>
+        <p:nvPicPr>
+          <p:cNvPr id="5" name="Picture 4"/>
+          <p:cNvPicPr>
+            <a:picLocks noChangeAspect="1"/>
+          </p:cNvPicPr>
+          <p:nvPr/>
+        </p:nvPicPr>
+        <p:blipFill>
+          <a:blip r:embed="rId3">
+            <a:extLst>
+              <a:ext uri="{28A0092B-C50C-407E-A947-70E740481C1C}">
+                <a14:useLocalDpi xmlns:a14="http://schemas.microsoft.com/office/drawing/2010/main" val="0"/>
+              </a:ext>
+            </a:extLst>
+          </a:blip>
+          <a:stretch>
+            <a:fillRect/>
+          </a:stretch>
+        </p:blipFill>
+        <p:spPr>
+          <a:xfrm>
+            <a:off x="6024369" y="723915"/>
+            <a:ext cx="2044695" cy="6134085"/>
+          </a:xfrm>
+          <a:prstGeom prst="rect">
+            <a:avLst/>
+          </a:prstGeom>
+        </p:spPr>
+      </p:pic>
+    </p:spTree>
+    <p:extLst>
+      <p:ext uri="{BB962C8B-B14F-4D97-AF65-F5344CB8AC3E}">
+        <p14:creationId xmlns:p14="http://schemas.microsoft.com/office/powerpoint/2010/main" val="976468942"/>
+      </p:ext>
+    </p:extLst>
+  </p:cSld>
+  <p:clrMapOvr>
+    <a:masterClrMapping/>
+  </p:clrMapOvr>
+  <p:timing>
+    <p:tnLst>
+      <p:par>
+        <p:cTn id="1" dur="indefinite" restart="never" nodeType="tmRoot">
+          <p:childTnLst>
+            <p:seq concurrent="1" nextAc="seek">
+              <p:cTn id="2" dur="indefinite" nodeType="mainSeq">
+                <p:childTnLst>
+                  <p:par>
+                    <p:cTn id="3" fill="hold">
+                      <p:stCondLst>
+                        <p:cond delay="indefinite"/>
+                      </p:stCondLst>
+                      <p:childTnLst>
+                        <p:par>
+                          <p:cTn id="4" fill="hold">
+                            <p:stCondLst>
+                              <p:cond delay="0"/>
+                            </p:stCondLst>
+                            <p:childTnLst>
+                              <p:par>
+                                <p:cTn id="5" presetID="1" presetClass="entr" presetSubtype="0" fill="hold" nodeType="clickEffect">
+                                  <p:stCondLst>
+                                    <p:cond delay="0"/>
+                                  </p:stCondLst>
+                                  <p:childTnLst>
+                                    <p:set>
+                                      <p:cBhvr>
+                                        <p:cTn id="6" dur="1" fill="hold">
+                                          <p:stCondLst>
+                                            <p:cond delay="0"/>
+                                          </p:stCondLst>
+                                        </p:cTn>
+                                        <p:tgtEl>
+                                          <p:spTgt spid="5"/>
+                                        </p:tgtEl>
+                                        <p:attrNameLst>
+                                          <p:attrName>style.visibility</p:attrName>
+                                        </p:attrNameLst>
+                                      </p:cBhvr>
+                                      <p:to>
+                                        <p:strVal val="visible"/>
+                                      </p:to>
+                                    </p:set>
+                                  </p:childTnLst>
+                                </p:cTn>
+                              </p:par>
+                            </p:childTnLst>
+                          </p:cTn>
+                        </p:par>
+                      </p:childTnLst>
+                    </p:cTn>
+                  </p:par>
+                </p:childTnLst>
+              </p:cTn>
+              <p:prevCondLst>
+                <p:cond evt="onPrev" delay="0">
+                  <p:tgtEl>
+                    <p:sldTgt/>
+                  </p:tgtEl>
+                </p:cond>
+              </p:prevCondLst>
+              <p:nextCondLst>
+                <p:cond evt="onNext" delay="0">
+                  <p:tgtEl>
+                    <p:sldTgt/>
+                  </p:tgtEl>
+                </p:cond>
+              </p:nextCondLst>
+            </p:seq>
+          </p:childTnLst>
+        </p:cTn>
+      </p:par>
+    </p:tnLst>
+  </p:timing>
+</p:sld>
+</file>
+
+<file path=ppt/slides/slide19.xml><?xml version="1.0" encoding="utf-8"?>
+<p:sld xmlns:a="http://schemas.openxmlformats.org/drawingml/2006/main" xmlns:r="http://schemas.openxmlformats.org/officeDocument/2006/relationships" xmlns:p="http://schemas.openxmlformats.org/presentationml/2006/main">
+  <p:cSld>
+    <p:spTree>
+      <p:nvGrpSpPr>
+        <p:cNvPr id="1" name=""/>
+        <p:cNvGrpSpPr/>
+        <p:nvPr/>
+      </p:nvGrpSpPr>
+      <p:grpSpPr>
+        <a:xfrm>
+          <a:off x="0" y="0"/>
+          <a:ext cx="0" cy="0"/>
+          <a:chOff x="0" y="0"/>
+          <a:chExt cx="0" cy="0"/>
+        </a:xfrm>
+      </p:grpSpPr>
+      <p:sp>
+        <p:nvSpPr>
+          <p:cNvPr id="2" name="Title 1"/>
+          <p:cNvSpPr>
+            <a:spLocks noGrp="1"/>
+          </p:cNvSpPr>
+          <p:nvPr>
+            <p:ph type="title"/>
+          </p:nvPr>
+        </p:nvSpPr>
+        <p:spPr/>
+        <p:txBody>
+          <a:bodyPr/>
+          <a:lstStyle/>
+          <a:p>
             <a:endParaRPr lang="en-US" dirty="0"/>
           </a:p>
         </p:txBody>
@@ -3681,7 +6414,7 @@
             <p:spPr>
               <a:xfrm>
                 <a:off x="1122338" y="4729459"/>
-                <a:ext cx="3449662" cy="740139"/>
+                <a:ext cx="3509422" cy="740139"/>
               </a:xfrm>
               <a:prstGeom prst="rect">
                 <a:avLst/>
@@ -3703,7 +6436,7 @@
                       <m:f>
                         <m:fPr>
                           <m:ctrlPr>
-                            <a:rPr lang="en-US" i="1">
+                            <a:rPr lang="en-US" i="1" smtClean="0">
                               <a:latin typeface="Cambria Math" charset="0"/>
                             </a:rPr>
                           </m:ctrlPr>
@@ -3898,7 +6631,7 @@
             <p:spPr>
               <a:xfrm>
                 <a:off x="1122338" y="4729459"/>
-                <a:ext cx="3449662" cy="740139"/>
+                <a:ext cx="3509422" cy="740139"/>
               </a:xfrm>
               <a:prstGeom prst="rect">
                 <a:avLst/>
@@ -7427,6 +10160,618 @@
 </p:sld>
 </file>
 
+<file path=ppt/slides/slide20.xml><?xml version="1.0" encoding="utf-8"?>
+<p:sld xmlns:a="http://schemas.openxmlformats.org/drawingml/2006/main" xmlns:r="http://schemas.openxmlformats.org/officeDocument/2006/relationships" xmlns:p="http://schemas.openxmlformats.org/presentationml/2006/main">
+  <p:cSld>
+    <p:spTree>
+      <p:nvGrpSpPr>
+        <p:cNvPr id="1" name=""/>
+        <p:cNvGrpSpPr/>
+        <p:nvPr/>
+      </p:nvGrpSpPr>
+      <p:grpSpPr>
+        <a:xfrm>
+          <a:off x="0" y="0"/>
+          <a:ext cx="0" cy="0"/>
+          <a:chOff x="0" y="0"/>
+          <a:chExt cx="0" cy="0"/>
+        </a:xfrm>
+      </p:grpSpPr>
+      <p:sp>
+        <p:nvSpPr>
+          <p:cNvPr id="2" name="Title 1"/>
+          <p:cNvSpPr>
+            <a:spLocks noGrp="1"/>
+          </p:cNvSpPr>
+          <p:nvPr>
+            <p:ph type="title"/>
+          </p:nvPr>
+        </p:nvSpPr>
+        <p:spPr/>
+        <p:txBody>
+          <a:bodyPr/>
+          <a:lstStyle/>
+          <a:p>
+            <a:endParaRPr lang="en-US"/>
+          </a:p>
+        </p:txBody>
+      </p:sp>
+    </p:spTree>
+    <p:extLst>
+      <p:ext uri="{BB962C8B-B14F-4D97-AF65-F5344CB8AC3E}">
+        <p14:creationId xmlns:p14="http://schemas.microsoft.com/office/powerpoint/2010/main" val="1335209366"/>
+      </p:ext>
+    </p:extLst>
+  </p:cSld>
+  <p:clrMapOvr>
+    <a:masterClrMapping/>
+  </p:clrMapOvr>
+  <p:timing>
+    <p:tnLst>
+      <p:par>
+        <p:cTn id="1" dur="indefinite" restart="never" nodeType="tmRoot"/>
+      </p:par>
+    </p:tnLst>
+  </p:timing>
+</p:sld>
+</file>
+
+<file path=ppt/slides/slide21.xml><?xml version="1.0" encoding="utf-8"?>
+<p:sld xmlns:a="http://schemas.openxmlformats.org/drawingml/2006/main" xmlns:r="http://schemas.openxmlformats.org/officeDocument/2006/relationships" xmlns:p="http://schemas.openxmlformats.org/presentationml/2006/main">
+  <p:cSld>
+    <p:spTree>
+      <p:nvGrpSpPr>
+        <p:cNvPr id="1" name=""/>
+        <p:cNvGrpSpPr/>
+        <p:nvPr/>
+      </p:nvGrpSpPr>
+      <p:grpSpPr>
+        <a:xfrm>
+          <a:off x="0" y="0"/>
+          <a:ext cx="0" cy="0"/>
+          <a:chOff x="0" y="0"/>
+          <a:chExt cx="0" cy="0"/>
+        </a:xfrm>
+      </p:grpSpPr>
+      <p:sp>
+        <p:nvSpPr>
+          <p:cNvPr id="2" name="Title 1"/>
+          <p:cNvSpPr>
+            <a:spLocks noGrp="1"/>
+          </p:cNvSpPr>
+          <p:nvPr>
+            <p:ph type="title"/>
+          </p:nvPr>
+        </p:nvSpPr>
+        <p:spPr/>
+        <p:txBody>
+          <a:bodyPr/>
+          <a:lstStyle/>
+          <a:p>
+            <a:r>
+              <a:rPr lang="en-US" dirty="0" smtClean="0"/>
+              <a:t>Conclusion</a:t>
+            </a:r>
+            <a:endParaRPr lang="en-US" dirty="0"/>
+          </a:p>
+        </p:txBody>
+      </p:sp>
+      <p:sp>
+        <p:nvSpPr>
+          <p:cNvPr id="3" name="Content Placeholder 2"/>
+          <p:cNvSpPr>
+            <a:spLocks noGrp="1"/>
+          </p:cNvSpPr>
+          <p:nvPr>
+            <p:ph idx="1"/>
+          </p:nvPr>
+        </p:nvSpPr>
+        <p:spPr/>
+        <p:txBody>
+          <a:bodyPr/>
+          <a:lstStyle/>
+          <a:p>
+            <a:endParaRPr lang="en-US" dirty="0"/>
+          </a:p>
+        </p:txBody>
+      </p:sp>
+    </p:spTree>
+    <p:extLst>
+      <p:ext uri="{BB962C8B-B14F-4D97-AF65-F5344CB8AC3E}">
+        <p14:creationId xmlns:p14="http://schemas.microsoft.com/office/powerpoint/2010/main" val="855487781"/>
+      </p:ext>
+    </p:extLst>
+  </p:cSld>
+  <p:clrMapOvr>
+    <a:masterClrMapping/>
+  </p:clrMapOvr>
+  <p:timing>
+    <p:tnLst>
+      <p:par>
+        <p:cTn id="1" dur="indefinite" restart="never" nodeType="tmRoot"/>
+      </p:par>
+    </p:tnLst>
+  </p:timing>
+</p:sld>
+</file>
+
+<file path=ppt/slides/slide22.xml><?xml version="1.0" encoding="utf-8"?>
+<p:sld xmlns:a="http://schemas.openxmlformats.org/drawingml/2006/main" xmlns:r="http://schemas.openxmlformats.org/officeDocument/2006/relationships" xmlns:p="http://schemas.openxmlformats.org/presentationml/2006/main">
+  <p:cSld>
+    <p:spTree>
+      <p:nvGrpSpPr>
+        <p:cNvPr id="1" name=""/>
+        <p:cNvGrpSpPr/>
+        <p:nvPr/>
+      </p:nvGrpSpPr>
+      <p:grpSpPr>
+        <a:xfrm>
+          <a:off x="0" y="0"/>
+          <a:ext cx="0" cy="0"/>
+          <a:chOff x="0" y="0"/>
+          <a:chExt cx="0" cy="0"/>
+        </a:xfrm>
+      </p:grpSpPr>
+      <p:sp>
+        <p:nvSpPr>
+          <p:cNvPr id="2" name="Title 1"/>
+          <p:cNvSpPr>
+            <a:spLocks noGrp="1"/>
+          </p:cNvSpPr>
+          <p:nvPr>
+            <p:ph type="title"/>
+          </p:nvPr>
+        </p:nvSpPr>
+        <p:spPr/>
+        <p:txBody>
+          <a:bodyPr/>
+          <a:lstStyle/>
+          <a:p>
+            <a:r>
+              <a:rPr lang="en-US" dirty="0" smtClean="0"/>
+              <a:t>Acknowledgements</a:t>
+            </a:r>
+            <a:endParaRPr lang="en-US" dirty="0"/>
+          </a:p>
+        </p:txBody>
+      </p:sp>
+      <p:sp>
+        <p:nvSpPr>
+          <p:cNvPr id="3" name="Content Placeholder 2"/>
+          <p:cNvSpPr>
+            <a:spLocks noGrp="1"/>
+          </p:cNvSpPr>
+          <p:nvPr>
+            <p:ph idx="1"/>
+          </p:nvPr>
+        </p:nvSpPr>
+        <p:spPr>
+          <a:xfrm>
+            <a:off x="628650" y="1825625"/>
+            <a:ext cx="3541014" cy="2917063"/>
+          </a:xfrm>
+        </p:spPr>
+        <p:txBody>
+          <a:bodyPr>
+            <a:normAutofit/>
+          </a:bodyPr>
+          <a:lstStyle/>
+          <a:p>
+            <a:r>
+              <a:rPr lang="en-US" sz="2400" dirty="0" err="1" smtClean="0"/>
+              <a:t>Courey</a:t>
+            </a:r>
+            <a:r>
+              <a:rPr lang="en-US" sz="2400" dirty="0" smtClean="0"/>
+              <a:t> Lab</a:t>
+            </a:r>
+          </a:p>
+          <a:p>
+            <a:pPr lvl="1"/>
+            <a:r>
+              <a:rPr lang="en-US" sz="2000" dirty="0" smtClean="0"/>
+              <a:t>Albert </a:t>
+            </a:r>
+            <a:r>
+              <a:rPr lang="en-US" sz="2000" dirty="0" err="1" smtClean="0"/>
+              <a:t>Courey</a:t>
+            </a:r>
+            <a:endParaRPr lang="en-US" sz="2000" dirty="0" smtClean="0"/>
+          </a:p>
+          <a:p>
+            <a:pPr lvl="1"/>
+            <a:r>
+              <a:rPr lang="en-US" sz="2000" dirty="0" smtClean="0"/>
+              <a:t>Joseph Cao</a:t>
+            </a:r>
+          </a:p>
+          <a:p>
+            <a:pPr lvl="1"/>
+            <a:r>
+              <a:rPr lang="en-US" sz="2000" dirty="0" smtClean="0"/>
+              <a:t>Kenny Chen</a:t>
+            </a:r>
+          </a:p>
+          <a:p>
+            <a:pPr lvl="1"/>
+            <a:r>
+              <a:rPr lang="en-US" sz="2000" dirty="0"/>
+              <a:t>Mitchell </a:t>
+            </a:r>
+            <a:r>
+              <a:rPr lang="en-US" sz="2000" dirty="0" smtClean="0"/>
+              <a:t>Kim </a:t>
+            </a:r>
+          </a:p>
+          <a:p>
+            <a:pPr lvl="1"/>
+            <a:r>
+              <a:rPr lang="en-US" sz="2000" dirty="0" smtClean="0"/>
+              <a:t>Pak </a:t>
+            </a:r>
+            <a:r>
+              <a:rPr lang="en-US" sz="2000" dirty="0" err="1" smtClean="0"/>
+              <a:t>Kwong</a:t>
+            </a:r>
+            <a:endParaRPr lang="en-US" sz="2000" dirty="0" smtClean="0"/>
+          </a:p>
+          <a:p>
+            <a:pPr lvl="1"/>
+            <a:r>
+              <a:rPr lang="en-US" sz="2000" dirty="0" err="1"/>
+              <a:t>Wiam</a:t>
+            </a:r>
+            <a:r>
+              <a:rPr lang="en-US" sz="2000" dirty="0"/>
+              <a:t> </a:t>
+            </a:r>
+            <a:r>
+              <a:rPr lang="en-US" sz="2000" dirty="0" err="1" smtClean="0"/>
+              <a:t>Turki-Judeh</a:t>
+            </a:r>
+            <a:endParaRPr lang="en-US" sz="2000" dirty="0" smtClean="0"/>
+          </a:p>
+          <a:p>
+            <a:pPr lvl="1"/>
+            <a:r>
+              <a:rPr lang="en-US" sz="2000" dirty="0" smtClean="0"/>
+              <a:t>Tom </a:t>
+            </a:r>
+            <a:r>
+              <a:rPr lang="en-US" sz="2000" dirty="0" err="1" smtClean="0"/>
+              <a:t>Yau</a:t>
+            </a:r>
+            <a:endParaRPr lang="en-US" sz="2000" dirty="0"/>
+          </a:p>
+          <a:p>
+            <a:pPr lvl="1"/>
+            <a:endParaRPr lang="en-US" sz="2000" dirty="0"/>
+          </a:p>
+        </p:txBody>
+      </p:sp>
+      <p:sp>
+        <p:nvSpPr>
+          <p:cNvPr id="4" name="Content Placeholder 2"/>
+          <p:cNvSpPr txBox="1">
+            <a:spLocks/>
+          </p:cNvSpPr>
+          <p:nvPr/>
+        </p:nvSpPr>
+        <p:spPr>
+          <a:xfrm>
+            <a:off x="4169664" y="1825625"/>
+            <a:ext cx="3541014" cy="2917063"/>
+          </a:xfrm>
+          <a:prstGeom prst="rect">
+            <a:avLst/>
+          </a:prstGeom>
+        </p:spPr>
+        <p:txBody>
+          <a:bodyPr vert="horz" lIns="91440" tIns="45720" rIns="91440" bIns="45720" rtlCol="0">
+            <a:normAutofit/>
+          </a:bodyPr>
+          <a:lstStyle>
+            <a:lvl1pPr marL="228600" indent="-228600" algn="l" defTabSz="914400" rtl="0" eaLnBrk="1" latinLnBrk="0" hangingPunct="1">
+              <a:lnSpc>
+                <a:spcPct val="90000"/>
+              </a:lnSpc>
+              <a:spcBef>
+                <a:spcPts val="1000"/>
+              </a:spcBef>
+              <a:buFont typeface="Arial" panose="020B0604020202020204" pitchFamily="34" charset="0"/>
+              <a:buChar char="•"/>
+              <a:defRPr sz="2800" kern="1200">
+                <a:solidFill>
+                  <a:schemeClr val="tx1"/>
+                </a:solidFill>
+                <a:latin typeface="+mn-lt"/>
+                <a:ea typeface="+mn-ea"/>
+                <a:cs typeface="+mn-cs"/>
+              </a:defRPr>
+            </a:lvl1pPr>
+            <a:lvl2pPr marL="685800" indent="-228600" algn="l" defTabSz="914400" rtl="0" eaLnBrk="1" latinLnBrk="0" hangingPunct="1">
+              <a:lnSpc>
+                <a:spcPct val="90000"/>
+              </a:lnSpc>
+              <a:spcBef>
+                <a:spcPts val="500"/>
+              </a:spcBef>
+              <a:buFont typeface="Arial" panose="020B0604020202020204" pitchFamily="34" charset="0"/>
+              <a:buChar char="•"/>
+              <a:defRPr sz="2400" kern="1200">
+                <a:solidFill>
+                  <a:schemeClr val="tx1"/>
+                </a:solidFill>
+                <a:latin typeface="+mn-lt"/>
+                <a:ea typeface="+mn-ea"/>
+                <a:cs typeface="+mn-cs"/>
+              </a:defRPr>
+            </a:lvl2pPr>
+            <a:lvl3pPr marL="1143000" indent="-228600" algn="l" defTabSz="914400" rtl="0" eaLnBrk="1" latinLnBrk="0" hangingPunct="1">
+              <a:lnSpc>
+                <a:spcPct val="90000"/>
+              </a:lnSpc>
+              <a:spcBef>
+                <a:spcPts val="500"/>
+              </a:spcBef>
+              <a:buFont typeface="Arial" panose="020B0604020202020204" pitchFamily="34" charset="0"/>
+              <a:buChar char="•"/>
+              <a:defRPr sz="2000" kern="1200">
+                <a:solidFill>
+                  <a:schemeClr val="tx1"/>
+                </a:solidFill>
+                <a:latin typeface="+mn-lt"/>
+                <a:ea typeface="+mn-ea"/>
+                <a:cs typeface="+mn-cs"/>
+              </a:defRPr>
+            </a:lvl3pPr>
+            <a:lvl4pPr marL="1600200" indent="-228600" algn="l" defTabSz="914400" rtl="0" eaLnBrk="1" latinLnBrk="0" hangingPunct="1">
+              <a:lnSpc>
+                <a:spcPct val="90000"/>
+              </a:lnSpc>
+              <a:spcBef>
+                <a:spcPts val="500"/>
+              </a:spcBef>
+              <a:buFont typeface="Arial" panose="020B0604020202020204" pitchFamily="34" charset="0"/>
+              <a:buChar char="•"/>
+              <a:defRPr sz="1800" kern="1200">
+                <a:solidFill>
+                  <a:schemeClr val="tx1"/>
+                </a:solidFill>
+                <a:latin typeface="+mn-lt"/>
+                <a:ea typeface="+mn-ea"/>
+                <a:cs typeface="+mn-cs"/>
+              </a:defRPr>
+            </a:lvl4pPr>
+            <a:lvl5pPr marL="2057400" indent="-228600" algn="l" defTabSz="914400" rtl="0" eaLnBrk="1" latinLnBrk="0" hangingPunct="1">
+              <a:lnSpc>
+                <a:spcPct val="90000"/>
+              </a:lnSpc>
+              <a:spcBef>
+                <a:spcPts val="500"/>
+              </a:spcBef>
+              <a:buFont typeface="Arial" panose="020B0604020202020204" pitchFamily="34" charset="0"/>
+              <a:buChar char="•"/>
+              <a:defRPr sz="1800" kern="1200">
+                <a:solidFill>
+                  <a:schemeClr val="tx1"/>
+                </a:solidFill>
+                <a:latin typeface="+mn-lt"/>
+                <a:ea typeface="+mn-ea"/>
+                <a:cs typeface="+mn-cs"/>
+              </a:defRPr>
+            </a:lvl5pPr>
+            <a:lvl6pPr marL="2514600" indent="-228600" algn="l" defTabSz="914400" rtl="0" eaLnBrk="1" latinLnBrk="0" hangingPunct="1">
+              <a:lnSpc>
+                <a:spcPct val="90000"/>
+              </a:lnSpc>
+              <a:spcBef>
+                <a:spcPts val="500"/>
+              </a:spcBef>
+              <a:buFont typeface="Arial" panose="020B0604020202020204" pitchFamily="34" charset="0"/>
+              <a:buChar char="•"/>
+              <a:defRPr sz="1800" kern="1200">
+                <a:solidFill>
+                  <a:schemeClr val="tx1"/>
+                </a:solidFill>
+                <a:latin typeface="+mn-lt"/>
+                <a:ea typeface="+mn-ea"/>
+                <a:cs typeface="+mn-cs"/>
+              </a:defRPr>
+            </a:lvl6pPr>
+            <a:lvl7pPr marL="2971800" indent="-228600" algn="l" defTabSz="914400" rtl="0" eaLnBrk="1" latinLnBrk="0" hangingPunct="1">
+              <a:lnSpc>
+                <a:spcPct val="90000"/>
+              </a:lnSpc>
+              <a:spcBef>
+                <a:spcPts val="500"/>
+              </a:spcBef>
+              <a:buFont typeface="Arial" panose="020B0604020202020204" pitchFamily="34" charset="0"/>
+              <a:buChar char="•"/>
+              <a:defRPr sz="1800" kern="1200">
+                <a:solidFill>
+                  <a:schemeClr val="tx1"/>
+                </a:solidFill>
+                <a:latin typeface="+mn-lt"/>
+                <a:ea typeface="+mn-ea"/>
+                <a:cs typeface="+mn-cs"/>
+              </a:defRPr>
+            </a:lvl7pPr>
+            <a:lvl8pPr marL="3429000" indent="-228600" algn="l" defTabSz="914400" rtl="0" eaLnBrk="1" latinLnBrk="0" hangingPunct="1">
+              <a:lnSpc>
+                <a:spcPct val="90000"/>
+              </a:lnSpc>
+              <a:spcBef>
+                <a:spcPts val="500"/>
+              </a:spcBef>
+              <a:buFont typeface="Arial" panose="020B0604020202020204" pitchFamily="34" charset="0"/>
+              <a:buChar char="•"/>
+              <a:defRPr sz="1800" kern="1200">
+                <a:solidFill>
+                  <a:schemeClr val="tx1"/>
+                </a:solidFill>
+                <a:latin typeface="+mn-lt"/>
+                <a:ea typeface="+mn-ea"/>
+                <a:cs typeface="+mn-cs"/>
+              </a:defRPr>
+            </a:lvl8pPr>
+            <a:lvl9pPr marL="3886200" indent="-228600" algn="l" defTabSz="914400" rtl="0" eaLnBrk="1" latinLnBrk="0" hangingPunct="1">
+              <a:lnSpc>
+                <a:spcPct val="90000"/>
+              </a:lnSpc>
+              <a:spcBef>
+                <a:spcPts val="500"/>
+              </a:spcBef>
+              <a:buFont typeface="Arial" panose="020B0604020202020204" pitchFamily="34" charset="0"/>
+              <a:buChar char="•"/>
+              <a:defRPr sz="1800" kern="1200">
+                <a:solidFill>
+                  <a:schemeClr val="tx1"/>
+                </a:solidFill>
+                <a:latin typeface="+mn-lt"/>
+                <a:ea typeface="+mn-ea"/>
+                <a:cs typeface="+mn-cs"/>
+              </a:defRPr>
+            </a:lvl9pPr>
+          </a:lstStyle>
+          <a:p>
+            <a:r>
+              <a:rPr lang="en-US" sz="2400" dirty="0"/>
+              <a:t>Committee</a:t>
+            </a:r>
+          </a:p>
+          <a:p>
+            <a:pPr lvl="1"/>
+            <a:r>
+              <a:rPr lang="en-US" sz="2000" dirty="0"/>
+              <a:t>Dr. James Bowie</a:t>
+            </a:r>
+          </a:p>
+          <a:p>
+            <a:pPr lvl="1"/>
+            <a:r>
+              <a:rPr lang="en-US" sz="2000" dirty="0"/>
+              <a:t>Dr. </a:t>
+            </a:r>
+            <a:r>
+              <a:rPr lang="en-US" sz="2000" dirty="0" smtClean="0"/>
+              <a:t>Michael </a:t>
+            </a:r>
+            <a:r>
+              <a:rPr lang="en-US" sz="2000" dirty="0"/>
+              <a:t>Carey</a:t>
+            </a:r>
+          </a:p>
+          <a:p>
+            <a:pPr lvl="1"/>
+            <a:r>
+              <a:rPr lang="en-US" sz="2000" dirty="0"/>
+              <a:t>Dr. </a:t>
+            </a:r>
+            <a:r>
+              <a:rPr lang="en-US" sz="2000" dirty="0" smtClean="0"/>
+              <a:t>Catherine </a:t>
+            </a:r>
+            <a:r>
+              <a:rPr lang="en-US" sz="2000" dirty="0"/>
+              <a:t>Clarke</a:t>
+            </a:r>
+          </a:p>
+          <a:p>
+            <a:pPr lvl="1"/>
+            <a:r>
+              <a:rPr lang="en-US" sz="2000" dirty="0"/>
+              <a:t>Dr. Volker </a:t>
+            </a:r>
+            <a:r>
+              <a:rPr lang="en-US" sz="2000" dirty="0" smtClean="0"/>
+              <a:t>Hartenstein</a:t>
+            </a:r>
+            <a:endParaRPr lang="en-US" sz="2000" dirty="0"/>
+          </a:p>
+        </p:txBody>
+      </p:sp>
+      <p:sp>
+        <p:nvSpPr>
+          <p:cNvPr id="5" name="Rectangle 4"/>
+          <p:cNvSpPr/>
+          <p:nvPr/>
+        </p:nvSpPr>
+        <p:spPr>
+          <a:xfrm>
+            <a:off x="628650" y="4742688"/>
+            <a:ext cx="4572000" cy="1077218"/>
+          </a:xfrm>
+          <a:prstGeom prst="rect">
+            <a:avLst/>
+          </a:prstGeom>
+        </p:spPr>
+        <p:txBody>
+          <a:bodyPr>
+            <a:spAutoFit/>
+          </a:bodyPr>
+          <a:lstStyle/>
+          <a:p>
+            <a:pPr marL="342900" indent="-342900">
+              <a:buFont typeface="Arial" charset="0"/>
+              <a:buChar char="•"/>
+            </a:pPr>
+            <a:r>
+              <a:rPr lang="en-US" sz="2400" dirty="0" smtClean="0"/>
+              <a:t>Collaborators</a:t>
+            </a:r>
+          </a:p>
+          <a:p>
+            <a:pPr marL="800100" lvl="1" indent="-342900">
+              <a:buFont typeface="Arial" charset="0"/>
+              <a:buChar char="•"/>
+            </a:pPr>
+            <a:r>
+              <a:rPr lang="en-US" sz="2000" dirty="0" smtClean="0"/>
+              <a:t>Sean Gallaher (Merchant Lab)</a:t>
+            </a:r>
+          </a:p>
+          <a:p>
+            <a:pPr marL="800100" lvl="1" indent="-342900">
+              <a:buFont typeface="Arial" charset="0"/>
+              <a:buChar char="•"/>
+            </a:pPr>
+            <a:r>
+              <a:rPr lang="en-US" sz="2000" dirty="0" smtClean="0"/>
+              <a:t>Kelvin Zhang (</a:t>
+            </a:r>
+            <a:r>
+              <a:rPr lang="en-US" sz="2000" dirty="0" err="1" smtClean="0"/>
+              <a:t>Zipursky</a:t>
+            </a:r>
+            <a:r>
+              <a:rPr lang="en-US" sz="2000" dirty="0" smtClean="0"/>
+              <a:t> Lab)</a:t>
+            </a:r>
+            <a:endParaRPr lang="en-US" sz="2000" dirty="0" smtClean="0"/>
+          </a:p>
+        </p:txBody>
+      </p:sp>
+    </p:spTree>
+    <p:extLst>
+      <p:ext uri="{BB962C8B-B14F-4D97-AF65-F5344CB8AC3E}">
+        <p14:creationId xmlns:p14="http://schemas.microsoft.com/office/powerpoint/2010/main" val="956308971"/>
+      </p:ext>
+    </p:extLst>
+  </p:cSld>
+  <p:clrMapOvr>
+    <a:masterClrMapping/>
+  </p:clrMapOvr>
+  <p:timing>
+    <p:tnLst>
+      <p:par>
+        <p:cTn id="1" dur="indefinite" restart="never" nodeType="tmRoot"/>
+      </p:par>
+    </p:tnLst>
+  </p:timing>
+</p:sld>
+</file>
+
 <file path=ppt/slides/slide3.xml><?xml version="1.0" encoding="utf-8"?>
 <p:sld xmlns:a="http://schemas.openxmlformats.org/drawingml/2006/main" xmlns:r="http://schemas.openxmlformats.org/officeDocument/2006/relationships" xmlns:p="http://schemas.openxmlformats.org/presentationml/2006/main">
   <p:cSld>
@@ -11159,12 +14504,42 @@
           <a:bodyPr/>
           <a:lstStyle/>
           <a:p>
-            <a:pPr marL="0" indent="0">
-              <a:buNone/>
+            <a:pPr marL="514350" indent="-514350">
+              <a:buAutoNum type="arabicPeriod"/>
             </a:pPr>
             <a:r>
               <a:rPr lang="en-US" dirty="0" smtClean="0"/>
-              <a:t>1. </a:t>
+              <a:t>A genome-wide survey of Groucho in the early embryo</a:t>
+            </a:r>
+          </a:p>
+          <a:p>
+            <a:pPr marL="514350" indent="-514350">
+              <a:buAutoNum type="arabicPeriod"/>
+            </a:pPr>
+            <a:endParaRPr lang="en-US" dirty="0" smtClean="0"/>
+          </a:p>
+          <a:p>
+            <a:pPr marL="514350" indent="-514350">
+              <a:buAutoNum type="arabicPeriod"/>
+            </a:pPr>
+            <a:r>
+              <a:rPr lang="en-US" dirty="0" smtClean="0"/>
+              <a:t>Identifying components of the Groucho gene regulatory network</a:t>
+            </a:r>
+          </a:p>
+          <a:p>
+            <a:pPr marL="514350" indent="-514350">
+              <a:buAutoNum type="arabicPeriod"/>
+            </a:pPr>
+            <a:endParaRPr lang="en-US" dirty="0" smtClean="0"/>
+          </a:p>
+          <a:p>
+            <a:pPr marL="514350" indent="-514350">
+              <a:buAutoNum type="arabicPeriod"/>
+            </a:pPr>
+            <a:r>
+              <a:rPr lang="en-US" dirty="0" smtClean="0"/>
+              <a:t>Groucho regulation and RNA PolII stalling</a:t>
             </a:r>
             <a:endParaRPr lang="en-US" dirty="0"/>
           </a:p>
@@ -11671,8 +15046,8 @@
           <a:p>
             <a:pPr algn="ctr"/>
             <a:r>
-              <a:rPr lang="en-US" sz="1200" dirty="0"/>
-              <a:t>mRNA transcription rate</a:t>
+              <a:rPr lang="en-US" sz="1200" dirty="0" smtClean="0"/>
+              <a:t>pre-mRNA profiling</a:t>
             </a:r>
             <a:endParaRPr lang="en-US" sz="1200" dirty="0"/>
           </a:p>

</xml_diff>